<commit_message>
Elise fixes scaling on figure 4
</commit_message>
<xml_diff>
--- a/figures/fig4.pptx
+++ b/figures/fig4.pptx
@@ -129,7 +129,7 @@
           <p:cNvPr id="2" name="Title 1">
             <a:extLst>
               <a:ext uri="{FF2B5EF4-FFF2-40B4-BE49-F238E27FC236}">
-                <a16:creationId xmlns:a16="http://schemas.microsoft.com/office/drawing/2014/main" id="{CF4CB2FD-2412-4F7C-EC48-3A2679B9A596}"/>
+                <a16:creationId xmlns:a16="http://schemas.microsoft.com/office/drawing/2014/main" id="{29E48AE3-0E1F-2E04-AED5-17CF4EA4D707}"/>
               </a:ext>
             </a:extLst>
           </p:cNvPr>
@@ -167,7 +167,7 @@
           <p:cNvPr id="3" name="Subtitle 2">
             <a:extLst>
               <a:ext uri="{FF2B5EF4-FFF2-40B4-BE49-F238E27FC236}">
-                <a16:creationId xmlns:a16="http://schemas.microsoft.com/office/drawing/2014/main" id="{F7A851C7-C84B-175E-8341-5AB6BF61844A}"/>
+                <a16:creationId xmlns:a16="http://schemas.microsoft.com/office/drawing/2014/main" id="{B9FA14E6-3981-E11C-1BD6-85E74C371101}"/>
               </a:ext>
             </a:extLst>
           </p:cNvPr>
@@ -238,7 +238,7 @@
           <p:cNvPr id="4" name="Date Placeholder 3">
             <a:extLst>
               <a:ext uri="{FF2B5EF4-FFF2-40B4-BE49-F238E27FC236}">
-                <a16:creationId xmlns:a16="http://schemas.microsoft.com/office/drawing/2014/main" id="{8A23E0F6-D58C-EE95-B309-4A8498F6CC22}"/>
+                <a16:creationId xmlns:a16="http://schemas.microsoft.com/office/drawing/2014/main" id="{9B735984-68D6-0BEC-AD60-4E5F2AB3145C}"/>
               </a:ext>
             </a:extLst>
           </p:cNvPr>
@@ -254,9 +254,9 @@
           <a:bodyPr/>
           <a:lstStyle/>
           <a:p>
-            <a:fld id="{01C53CDF-468F-F34E-866B-14F3754B9FCD}" type="datetimeFigureOut">
+            <a:fld id="{74B704BF-15E6-864E-815E-8192F4435023}" type="datetimeFigureOut">
               <a:rPr lang="en-US" smtClean="0"/>
-              <a:t>7/20/23</a:t>
+              <a:t>9/17/24</a:t>
             </a:fld>
             <a:endParaRPr lang="en-US"/>
           </a:p>
@@ -267,7 +267,7 @@
           <p:cNvPr id="5" name="Footer Placeholder 4">
             <a:extLst>
               <a:ext uri="{FF2B5EF4-FFF2-40B4-BE49-F238E27FC236}">
-                <a16:creationId xmlns:a16="http://schemas.microsoft.com/office/drawing/2014/main" id="{E2CA3A06-C66A-33BA-1431-B197EA39D0E4}"/>
+                <a16:creationId xmlns:a16="http://schemas.microsoft.com/office/drawing/2014/main" id="{BEC3312F-B65E-3ECD-ABF5-8C74EAA82E39}"/>
               </a:ext>
             </a:extLst>
           </p:cNvPr>
@@ -292,7 +292,7 @@
           <p:cNvPr id="6" name="Slide Number Placeholder 5">
             <a:extLst>
               <a:ext uri="{FF2B5EF4-FFF2-40B4-BE49-F238E27FC236}">
-                <a16:creationId xmlns:a16="http://schemas.microsoft.com/office/drawing/2014/main" id="{EBD1FA2D-FB62-CBD7-F765-547181227EC9}"/>
+                <a16:creationId xmlns:a16="http://schemas.microsoft.com/office/drawing/2014/main" id="{0C77D68C-08B3-C118-BB7E-955AD420D567}"/>
               </a:ext>
             </a:extLst>
           </p:cNvPr>
@@ -308,7 +308,7 @@
           <a:bodyPr/>
           <a:lstStyle/>
           <a:p>
-            <a:fld id="{61FBC1B1-0FD7-874E-9707-67F6C0BC0DAC}" type="slidenum">
+            <a:fld id="{4835B14C-06B9-7A4B-BA04-7745DB894A13}" type="slidenum">
               <a:rPr lang="en-US" smtClean="0"/>
               <a:t>‹#›</a:t>
             </a:fld>
@@ -319,7 +319,7 @@
     </p:spTree>
     <p:extLst>
       <p:ext uri="{BB962C8B-B14F-4D97-AF65-F5344CB8AC3E}">
-        <p14:creationId xmlns:p14="http://schemas.microsoft.com/office/powerpoint/2010/main" val="2524887222"/>
+        <p14:creationId xmlns:p14="http://schemas.microsoft.com/office/powerpoint/2010/main" val="570200909"/>
       </p:ext>
     </p:extLst>
   </p:cSld>
@@ -351,7 +351,7 @@
           <p:cNvPr id="2" name="Title 1">
             <a:extLst>
               <a:ext uri="{FF2B5EF4-FFF2-40B4-BE49-F238E27FC236}">
-                <a16:creationId xmlns:a16="http://schemas.microsoft.com/office/drawing/2014/main" id="{D01FBB89-51A9-0186-162E-5B2FAD445630}"/>
+                <a16:creationId xmlns:a16="http://schemas.microsoft.com/office/drawing/2014/main" id="{3DADAC82-31DF-0B31-710C-04CDE2724817}"/>
               </a:ext>
             </a:extLst>
           </p:cNvPr>
@@ -380,7 +380,7 @@
           <p:cNvPr id="3" name="Vertical Text Placeholder 2">
             <a:extLst>
               <a:ext uri="{FF2B5EF4-FFF2-40B4-BE49-F238E27FC236}">
-                <a16:creationId xmlns:a16="http://schemas.microsoft.com/office/drawing/2014/main" id="{398F5EEA-14CA-4BC3-1446-A9EDC760C867}"/>
+                <a16:creationId xmlns:a16="http://schemas.microsoft.com/office/drawing/2014/main" id="{80210B53-EEE1-15EE-5D27-EA014A60A5EF}"/>
               </a:ext>
             </a:extLst>
           </p:cNvPr>
@@ -438,7 +438,7 @@
           <p:cNvPr id="4" name="Date Placeholder 3">
             <a:extLst>
               <a:ext uri="{FF2B5EF4-FFF2-40B4-BE49-F238E27FC236}">
-                <a16:creationId xmlns:a16="http://schemas.microsoft.com/office/drawing/2014/main" id="{0B3F814F-1E77-142E-F55C-BE452945DC47}"/>
+                <a16:creationId xmlns:a16="http://schemas.microsoft.com/office/drawing/2014/main" id="{6F1E646C-1891-570C-A3D5-F503A776FCD5}"/>
               </a:ext>
             </a:extLst>
           </p:cNvPr>
@@ -454,9 +454,9 @@
           <a:bodyPr/>
           <a:lstStyle/>
           <a:p>
-            <a:fld id="{01C53CDF-468F-F34E-866B-14F3754B9FCD}" type="datetimeFigureOut">
+            <a:fld id="{74B704BF-15E6-864E-815E-8192F4435023}" type="datetimeFigureOut">
               <a:rPr lang="en-US" smtClean="0"/>
-              <a:t>7/20/23</a:t>
+              <a:t>9/17/24</a:t>
             </a:fld>
             <a:endParaRPr lang="en-US"/>
           </a:p>
@@ -467,7 +467,7 @@
           <p:cNvPr id="5" name="Footer Placeholder 4">
             <a:extLst>
               <a:ext uri="{FF2B5EF4-FFF2-40B4-BE49-F238E27FC236}">
-                <a16:creationId xmlns:a16="http://schemas.microsoft.com/office/drawing/2014/main" id="{26CD7141-9A08-290A-33C5-AE45B74297A9}"/>
+                <a16:creationId xmlns:a16="http://schemas.microsoft.com/office/drawing/2014/main" id="{876701E9-7DDF-DAB2-83AB-CC7A55B786B4}"/>
               </a:ext>
             </a:extLst>
           </p:cNvPr>
@@ -492,7 +492,7 @@
           <p:cNvPr id="6" name="Slide Number Placeholder 5">
             <a:extLst>
               <a:ext uri="{FF2B5EF4-FFF2-40B4-BE49-F238E27FC236}">
-                <a16:creationId xmlns:a16="http://schemas.microsoft.com/office/drawing/2014/main" id="{4B576259-23A4-A8B4-21AD-21FCC67E2A6D}"/>
+                <a16:creationId xmlns:a16="http://schemas.microsoft.com/office/drawing/2014/main" id="{2EDF2FB5-94D1-FF31-7AA8-DB08E5AE0778}"/>
               </a:ext>
             </a:extLst>
           </p:cNvPr>
@@ -508,7 +508,7 @@
           <a:bodyPr/>
           <a:lstStyle/>
           <a:p>
-            <a:fld id="{61FBC1B1-0FD7-874E-9707-67F6C0BC0DAC}" type="slidenum">
+            <a:fld id="{4835B14C-06B9-7A4B-BA04-7745DB894A13}" type="slidenum">
               <a:rPr lang="en-US" smtClean="0"/>
               <a:t>‹#›</a:t>
             </a:fld>
@@ -519,7 +519,7 @@
     </p:spTree>
     <p:extLst>
       <p:ext uri="{BB962C8B-B14F-4D97-AF65-F5344CB8AC3E}">
-        <p14:creationId xmlns:p14="http://schemas.microsoft.com/office/powerpoint/2010/main" val="1155878872"/>
+        <p14:creationId xmlns:p14="http://schemas.microsoft.com/office/powerpoint/2010/main" val="324667563"/>
       </p:ext>
     </p:extLst>
   </p:cSld>
@@ -551,7 +551,7 @@
           <p:cNvPr id="2" name="Vertical Title 1">
             <a:extLst>
               <a:ext uri="{FF2B5EF4-FFF2-40B4-BE49-F238E27FC236}">
-                <a16:creationId xmlns:a16="http://schemas.microsoft.com/office/drawing/2014/main" id="{ED005F7F-39B5-B46F-C5D7-7EDB96238096}"/>
+                <a16:creationId xmlns:a16="http://schemas.microsoft.com/office/drawing/2014/main" id="{F3252B07-1447-C446-EFF2-2CEA55259224}"/>
               </a:ext>
             </a:extLst>
           </p:cNvPr>
@@ -585,7 +585,7 @@
           <p:cNvPr id="3" name="Vertical Text Placeholder 2">
             <a:extLst>
               <a:ext uri="{FF2B5EF4-FFF2-40B4-BE49-F238E27FC236}">
-                <a16:creationId xmlns:a16="http://schemas.microsoft.com/office/drawing/2014/main" id="{825401EE-DABE-BCF4-296E-4D6CDD9B74D4}"/>
+                <a16:creationId xmlns:a16="http://schemas.microsoft.com/office/drawing/2014/main" id="{FAEC906D-CBAC-CC88-0586-AD69AF09609D}"/>
               </a:ext>
             </a:extLst>
           </p:cNvPr>
@@ -648,7 +648,7 @@
           <p:cNvPr id="4" name="Date Placeholder 3">
             <a:extLst>
               <a:ext uri="{FF2B5EF4-FFF2-40B4-BE49-F238E27FC236}">
-                <a16:creationId xmlns:a16="http://schemas.microsoft.com/office/drawing/2014/main" id="{37473574-FF77-E661-D486-D6B9404DE709}"/>
+                <a16:creationId xmlns:a16="http://schemas.microsoft.com/office/drawing/2014/main" id="{3C48B02F-EC5D-01E4-D3A2-EBD83504538D}"/>
               </a:ext>
             </a:extLst>
           </p:cNvPr>
@@ -664,9 +664,9 @@
           <a:bodyPr/>
           <a:lstStyle/>
           <a:p>
-            <a:fld id="{01C53CDF-468F-F34E-866B-14F3754B9FCD}" type="datetimeFigureOut">
+            <a:fld id="{74B704BF-15E6-864E-815E-8192F4435023}" type="datetimeFigureOut">
               <a:rPr lang="en-US" smtClean="0"/>
-              <a:t>7/20/23</a:t>
+              <a:t>9/17/24</a:t>
             </a:fld>
             <a:endParaRPr lang="en-US"/>
           </a:p>
@@ -677,7 +677,7 @@
           <p:cNvPr id="5" name="Footer Placeholder 4">
             <a:extLst>
               <a:ext uri="{FF2B5EF4-FFF2-40B4-BE49-F238E27FC236}">
-                <a16:creationId xmlns:a16="http://schemas.microsoft.com/office/drawing/2014/main" id="{CCEFB7AD-540C-C18A-6F56-18273AEF1875}"/>
+                <a16:creationId xmlns:a16="http://schemas.microsoft.com/office/drawing/2014/main" id="{7561E6F7-4C11-7267-0DE1-2176ED6BA663}"/>
               </a:ext>
             </a:extLst>
           </p:cNvPr>
@@ -702,7 +702,7 @@
           <p:cNvPr id="6" name="Slide Number Placeholder 5">
             <a:extLst>
               <a:ext uri="{FF2B5EF4-FFF2-40B4-BE49-F238E27FC236}">
-                <a16:creationId xmlns:a16="http://schemas.microsoft.com/office/drawing/2014/main" id="{CE56AEB5-02ED-0FE6-7A14-64031BE76284}"/>
+                <a16:creationId xmlns:a16="http://schemas.microsoft.com/office/drawing/2014/main" id="{CAF8E4AA-C13B-7E72-1852-2BBD901474E5}"/>
               </a:ext>
             </a:extLst>
           </p:cNvPr>
@@ -718,7 +718,7 @@
           <a:bodyPr/>
           <a:lstStyle/>
           <a:p>
-            <a:fld id="{61FBC1B1-0FD7-874E-9707-67F6C0BC0DAC}" type="slidenum">
+            <a:fld id="{4835B14C-06B9-7A4B-BA04-7745DB894A13}" type="slidenum">
               <a:rPr lang="en-US" smtClean="0"/>
               <a:t>‹#›</a:t>
             </a:fld>
@@ -729,7 +729,7 @@
     </p:spTree>
     <p:extLst>
       <p:ext uri="{BB962C8B-B14F-4D97-AF65-F5344CB8AC3E}">
-        <p14:creationId xmlns:p14="http://schemas.microsoft.com/office/powerpoint/2010/main" val="1587642994"/>
+        <p14:creationId xmlns:p14="http://schemas.microsoft.com/office/powerpoint/2010/main" val="2808839426"/>
       </p:ext>
     </p:extLst>
   </p:cSld>
@@ -761,7 +761,7 @@
           <p:cNvPr id="2" name="Title 1">
             <a:extLst>
               <a:ext uri="{FF2B5EF4-FFF2-40B4-BE49-F238E27FC236}">
-                <a16:creationId xmlns:a16="http://schemas.microsoft.com/office/drawing/2014/main" id="{82039408-8497-74F9-9718-2387FC485EFB}"/>
+                <a16:creationId xmlns:a16="http://schemas.microsoft.com/office/drawing/2014/main" id="{6347B76D-3AB1-C8F6-63AF-380BFC84A0DF}"/>
               </a:ext>
             </a:extLst>
           </p:cNvPr>
@@ -790,7 +790,7 @@
           <p:cNvPr id="3" name="Content Placeholder 2">
             <a:extLst>
               <a:ext uri="{FF2B5EF4-FFF2-40B4-BE49-F238E27FC236}">
-                <a16:creationId xmlns:a16="http://schemas.microsoft.com/office/drawing/2014/main" id="{2FE12D2B-7ACF-10FC-B66E-CAF939FC3EA8}"/>
+                <a16:creationId xmlns:a16="http://schemas.microsoft.com/office/drawing/2014/main" id="{63D57BD7-64E5-3283-A63C-F38CE5B1F9F5}"/>
               </a:ext>
             </a:extLst>
           </p:cNvPr>
@@ -848,7 +848,7 @@
           <p:cNvPr id="4" name="Date Placeholder 3">
             <a:extLst>
               <a:ext uri="{FF2B5EF4-FFF2-40B4-BE49-F238E27FC236}">
-                <a16:creationId xmlns:a16="http://schemas.microsoft.com/office/drawing/2014/main" id="{36117695-1E1A-2BE8-B1A6-E5115FB50C7A}"/>
+                <a16:creationId xmlns:a16="http://schemas.microsoft.com/office/drawing/2014/main" id="{0A27D6C1-1BF1-0490-760D-F1DDC539FEC8}"/>
               </a:ext>
             </a:extLst>
           </p:cNvPr>
@@ -864,9 +864,9 @@
           <a:bodyPr/>
           <a:lstStyle/>
           <a:p>
-            <a:fld id="{01C53CDF-468F-F34E-866B-14F3754B9FCD}" type="datetimeFigureOut">
+            <a:fld id="{74B704BF-15E6-864E-815E-8192F4435023}" type="datetimeFigureOut">
               <a:rPr lang="en-US" smtClean="0"/>
-              <a:t>7/20/23</a:t>
+              <a:t>9/17/24</a:t>
             </a:fld>
             <a:endParaRPr lang="en-US"/>
           </a:p>
@@ -877,7 +877,7 @@
           <p:cNvPr id="5" name="Footer Placeholder 4">
             <a:extLst>
               <a:ext uri="{FF2B5EF4-FFF2-40B4-BE49-F238E27FC236}">
-                <a16:creationId xmlns:a16="http://schemas.microsoft.com/office/drawing/2014/main" id="{E7085A09-674A-4112-84DA-C90599E9CD54}"/>
+                <a16:creationId xmlns:a16="http://schemas.microsoft.com/office/drawing/2014/main" id="{456D74BC-E947-58F5-E6C7-CEFB9A86BCDA}"/>
               </a:ext>
             </a:extLst>
           </p:cNvPr>
@@ -902,7 +902,7 @@
           <p:cNvPr id="6" name="Slide Number Placeholder 5">
             <a:extLst>
               <a:ext uri="{FF2B5EF4-FFF2-40B4-BE49-F238E27FC236}">
-                <a16:creationId xmlns:a16="http://schemas.microsoft.com/office/drawing/2014/main" id="{7B839D4D-2095-9F4C-6E3C-FB898AE3ECE5}"/>
+                <a16:creationId xmlns:a16="http://schemas.microsoft.com/office/drawing/2014/main" id="{7D4C806D-5657-9E16-7DB2-2847D6618D3E}"/>
               </a:ext>
             </a:extLst>
           </p:cNvPr>
@@ -918,7 +918,7 @@
           <a:bodyPr/>
           <a:lstStyle/>
           <a:p>
-            <a:fld id="{61FBC1B1-0FD7-874E-9707-67F6C0BC0DAC}" type="slidenum">
+            <a:fld id="{4835B14C-06B9-7A4B-BA04-7745DB894A13}" type="slidenum">
               <a:rPr lang="en-US" smtClean="0"/>
               <a:t>‹#›</a:t>
             </a:fld>
@@ -929,7 +929,7 @@
     </p:spTree>
     <p:extLst>
       <p:ext uri="{BB962C8B-B14F-4D97-AF65-F5344CB8AC3E}">
-        <p14:creationId xmlns:p14="http://schemas.microsoft.com/office/powerpoint/2010/main" val="2282856389"/>
+        <p14:creationId xmlns:p14="http://schemas.microsoft.com/office/powerpoint/2010/main" val="554597450"/>
       </p:ext>
     </p:extLst>
   </p:cSld>
@@ -961,7 +961,7 @@
           <p:cNvPr id="2" name="Title 1">
             <a:extLst>
               <a:ext uri="{FF2B5EF4-FFF2-40B4-BE49-F238E27FC236}">
-                <a16:creationId xmlns:a16="http://schemas.microsoft.com/office/drawing/2014/main" id="{397FEBCB-7A0D-7373-C5E2-F8E5051E0F84}"/>
+                <a16:creationId xmlns:a16="http://schemas.microsoft.com/office/drawing/2014/main" id="{3F495E87-A526-6326-CFA0-DEEE25572897}"/>
               </a:ext>
             </a:extLst>
           </p:cNvPr>
@@ -999,7 +999,7 @@
           <p:cNvPr id="3" name="Text Placeholder 2">
             <a:extLst>
               <a:ext uri="{FF2B5EF4-FFF2-40B4-BE49-F238E27FC236}">
-                <a16:creationId xmlns:a16="http://schemas.microsoft.com/office/drawing/2014/main" id="{0CA2DC7E-C8FA-7D7C-031D-F7C1BA1B320B}"/>
+                <a16:creationId xmlns:a16="http://schemas.microsoft.com/office/drawing/2014/main" id="{18C89F39-F9E8-520C-8BF4-C74153B3D866}"/>
               </a:ext>
             </a:extLst>
           </p:cNvPr>
@@ -1024,7 +1024,7 @@
               <a:defRPr sz="2400">
                 <a:solidFill>
                   <a:schemeClr val="tx1">
-                    <a:tint val="75000"/>
+                    <a:tint val="82000"/>
                   </a:schemeClr>
                 </a:solidFill>
               </a:defRPr>
@@ -1034,7 +1034,7 @@
               <a:defRPr sz="2000">
                 <a:solidFill>
                   <a:schemeClr val="tx1">
-                    <a:tint val="75000"/>
+                    <a:tint val="82000"/>
                   </a:schemeClr>
                 </a:solidFill>
               </a:defRPr>
@@ -1044,7 +1044,7 @@
               <a:defRPr sz="1800">
                 <a:solidFill>
                   <a:schemeClr val="tx1">
-                    <a:tint val="75000"/>
+                    <a:tint val="82000"/>
                   </a:schemeClr>
                 </a:solidFill>
               </a:defRPr>
@@ -1054,7 +1054,7 @@
               <a:defRPr sz="1600">
                 <a:solidFill>
                   <a:schemeClr val="tx1">
-                    <a:tint val="75000"/>
+                    <a:tint val="82000"/>
                   </a:schemeClr>
                 </a:solidFill>
               </a:defRPr>
@@ -1064,7 +1064,7 @@
               <a:defRPr sz="1600">
                 <a:solidFill>
                   <a:schemeClr val="tx1">
-                    <a:tint val="75000"/>
+                    <a:tint val="82000"/>
                   </a:schemeClr>
                 </a:solidFill>
               </a:defRPr>
@@ -1074,7 +1074,7 @@
               <a:defRPr sz="1600">
                 <a:solidFill>
                   <a:schemeClr val="tx1">
-                    <a:tint val="75000"/>
+                    <a:tint val="82000"/>
                   </a:schemeClr>
                 </a:solidFill>
               </a:defRPr>
@@ -1084,7 +1084,7 @@
               <a:defRPr sz="1600">
                 <a:solidFill>
                   <a:schemeClr val="tx1">
-                    <a:tint val="75000"/>
+                    <a:tint val="82000"/>
                   </a:schemeClr>
                 </a:solidFill>
               </a:defRPr>
@@ -1094,7 +1094,7 @@
               <a:defRPr sz="1600">
                 <a:solidFill>
                   <a:schemeClr val="tx1">
-                    <a:tint val="75000"/>
+                    <a:tint val="82000"/>
                   </a:schemeClr>
                 </a:solidFill>
               </a:defRPr>
@@ -1104,7 +1104,7 @@
               <a:defRPr sz="1600">
                 <a:solidFill>
                   <a:schemeClr val="tx1">
-                    <a:tint val="75000"/>
+                    <a:tint val="82000"/>
                   </a:schemeClr>
                 </a:solidFill>
               </a:defRPr>
@@ -1124,7 +1124,7 @@
           <p:cNvPr id="4" name="Date Placeholder 3">
             <a:extLst>
               <a:ext uri="{FF2B5EF4-FFF2-40B4-BE49-F238E27FC236}">
-                <a16:creationId xmlns:a16="http://schemas.microsoft.com/office/drawing/2014/main" id="{42309B10-A78A-8451-4B53-F439476E7CC5}"/>
+                <a16:creationId xmlns:a16="http://schemas.microsoft.com/office/drawing/2014/main" id="{AE05FAB5-9FF8-2EF9-E976-C759208CAD11}"/>
               </a:ext>
             </a:extLst>
           </p:cNvPr>
@@ -1140,9 +1140,9 @@
           <a:bodyPr/>
           <a:lstStyle/>
           <a:p>
-            <a:fld id="{01C53CDF-468F-F34E-866B-14F3754B9FCD}" type="datetimeFigureOut">
+            <a:fld id="{74B704BF-15E6-864E-815E-8192F4435023}" type="datetimeFigureOut">
               <a:rPr lang="en-US" smtClean="0"/>
-              <a:t>7/20/23</a:t>
+              <a:t>9/17/24</a:t>
             </a:fld>
             <a:endParaRPr lang="en-US"/>
           </a:p>
@@ -1153,7 +1153,7 @@
           <p:cNvPr id="5" name="Footer Placeholder 4">
             <a:extLst>
               <a:ext uri="{FF2B5EF4-FFF2-40B4-BE49-F238E27FC236}">
-                <a16:creationId xmlns:a16="http://schemas.microsoft.com/office/drawing/2014/main" id="{BFBBFCAC-5C93-8754-1EBE-D1163F7BDC58}"/>
+                <a16:creationId xmlns:a16="http://schemas.microsoft.com/office/drawing/2014/main" id="{5AA4BA22-0F05-6994-145B-C329D0234A99}"/>
               </a:ext>
             </a:extLst>
           </p:cNvPr>
@@ -1178,7 +1178,7 @@
           <p:cNvPr id="6" name="Slide Number Placeholder 5">
             <a:extLst>
               <a:ext uri="{FF2B5EF4-FFF2-40B4-BE49-F238E27FC236}">
-                <a16:creationId xmlns:a16="http://schemas.microsoft.com/office/drawing/2014/main" id="{8DB516E6-EEAE-B59D-D2F9-E5208599F37F}"/>
+                <a16:creationId xmlns:a16="http://schemas.microsoft.com/office/drawing/2014/main" id="{9BDA9270-E68E-6028-937D-42DA6313321D}"/>
               </a:ext>
             </a:extLst>
           </p:cNvPr>
@@ -1194,7 +1194,7 @@
           <a:bodyPr/>
           <a:lstStyle/>
           <a:p>
-            <a:fld id="{61FBC1B1-0FD7-874E-9707-67F6C0BC0DAC}" type="slidenum">
+            <a:fld id="{4835B14C-06B9-7A4B-BA04-7745DB894A13}" type="slidenum">
               <a:rPr lang="en-US" smtClean="0"/>
               <a:t>‹#›</a:t>
             </a:fld>
@@ -1205,7 +1205,7 @@
     </p:spTree>
     <p:extLst>
       <p:ext uri="{BB962C8B-B14F-4D97-AF65-F5344CB8AC3E}">
-        <p14:creationId xmlns:p14="http://schemas.microsoft.com/office/powerpoint/2010/main" val="3624744673"/>
+        <p14:creationId xmlns:p14="http://schemas.microsoft.com/office/powerpoint/2010/main" val="4009891917"/>
       </p:ext>
     </p:extLst>
   </p:cSld>
@@ -1237,7 +1237,7 @@
           <p:cNvPr id="2" name="Title 1">
             <a:extLst>
               <a:ext uri="{FF2B5EF4-FFF2-40B4-BE49-F238E27FC236}">
-                <a16:creationId xmlns:a16="http://schemas.microsoft.com/office/drawing/2014/main" id="{EA198CF5-545C-CE58-EBC1-65AADA1CED90}"/>
+                <a16:creationId xmlns:a16="http://schemas.microsoft.com/office/drawing/2014/main" id="{69E850DD-F96E-1B1F-B6D3-71C4D6ABC770}"/>
               </a:ext>
             </a:extLst>
           </p:cNvPr>
@@ -1266,7 +1266,7 @@
           <p:cNvPr id="3" name="Content Placeholder 2">
             <a:extLst>
               <a:ext uri="{FF2B5EF4-FFF2-40B4-BE49-F238E27FC236}">
-                <a16:creationId xmlns:a16="http://schemas.microsoft.com/office/drawing/2014/main" id="{3791B9B4-3B5C-A82F-6D50-D710B04DDDE1}"/>
+                <a16:creationId xmlns:a16="http://schemas.microsoft.com/office/drawing/2014/main" id="{7C2B9792-640A-6A51-3368-802F4EB816B3}"/>
               </a:ext>
             </a:extLst>
           </p:cNvPr>
@@ -1329,7 +1329,7 @@
           <p:cNvPr id="4" name="Content Placeholder 3">
             <a:extLst>
               <a:ext uri="{FF2B5EF4-FFF2-40B4-BE49-F238E27FC236}">
-                <a16:creationId xmlns:a16="http://schemas.microsoft.com/office/drawing/2014/main" id="{0927000C-6CEA-8488-10CF-2CAB7CEAF6F6}"/>
+                <a16:creationId xmlns:a16="http://schemas.microsoft.com/office/drawing/2014/main" id="{BDFABA62-87A2-3C19-AA13-71A8C8FA127B}"/>
               </a:ext>
             </a:extLst>
           </p:cNvPr>
@@ -1392,7 +1392,7 @@
           <p:cNvPr id="5" name="Date Placeholder 4">
             <a:extLst>
               <a:ext uri="{FF2B5EF4-FFF2-40B4-BE49-F238E27FC236}">
-                <a16:creationId xmlns:a16="http://schemas.microsoft.com/office/drawing/2014/main" id="{FDEFE5AF-E37C-A229-97CF-09194AF8FDE8}"/>
+                <a16:creationId xmlns:a16="http://schemas.microsoft.com/office/drawing/2014/main" id="{A7D52098-1527-9D58-8E4C-DF9A34F81CA0}"/>
               </a:ext>
             </a:extLst>
           </p:cNvPr>
@@ -1408,9 +1408,9 @@
           <a:bodyPr/>
           <a:lstStyle/>
           <a:p>
-            <a:fld id="{01C53CDF-468F-F34E-866B-14F3754B9FCD}" type="datetimeFigureOut">
+            <a:fld id="{74B704BF-15E6-864E-815E-8192F4435023}" type="datetimeFigureOut">
               <a:rPr lang="en-US" smtClean="0"/>
-              <a:t>7/20/23</a:t>
+              <a:t>9/17/24</a:t>
             </a:fld>
             <a:endParaRPr lang="en-US"/>
           </a:p>
@@ -1421,7 +1421,7 @@
           <p:cNvPr id="6" name="Footer Placeholder 5">
             <a:extLst>
               <a:ext uri="{FF2B5EF4-FFF2-40B4-BE49-F238E27FC236}">
-                <a16:creationId xmlns:a16="http://schemas.microsoft.com/office/drawing/2014/main" id="{EE5FF86E-675D-559C-EF6B-AEA2B01F41AD}"/>
+                <a16:creationId xmlns:a16="http://schemas.microsoft.com/office/drawing/2014/main" id="{2124E742-77F6-B020-E263-71B179173F70}"/>
               </a:ext>
             </a:extLst>
           </p:cNvPr>
@@ -1446,7 +1446,7 @@
           <p:cNvPr id="7" name="Slide Number Placeholder 6">
             <a:extLst>
               <a:ext uri="{FF2B5EF4-FFF2-40B4-BE49-F238E27FC236}">
-                <a16:creationId xmlns:a16="http://schemas.microsoft.com/office/drawing/2014/main" id="{00542612-EC0B-2770-C6D4-1E4C36DBB83B}"/>
+                <a16:creationId xmlns:a16="http://schemas.microsoft.com/office/drawing/2014/main" id="{1165FEAE-CBD5-C68D-43C6-71499FD5FC37}"/>
               </a:ext>
             </a:extLst>
           </p:cNvPr>
@@ -1462,7 +1462,7 @@
           <a:bodyPr/>
           <a:lstStyle/>
           <a:p>
-            <a:fld id="{61FBC1B1-0FD7-874E-9707-67F6C0BC0DAC}" type="slidenum">
+            <a:fld id="{4835B14C-06B9-7A4B-BA04-7745DB894A13}" type="slidenum">
               <a:rPr lang="en-US" smtClean="0"/>
               <a:t>‹#›</a:t>
             </a:fld>
@@ -1473,7 +1473,7 @@
     </p:spTree>
     <p:extLst>
       <p:ext uri="{BB962C8B-B14F-4D97-AF65-F5344CB8AC3E}">
-        <p14:creationId xmlns:p14="http://schemas.microsoft.com/office/powerpoint/2010/main" val="529607670"/>
+        <p14:creationId xmlns:p14="http://schemas.microsoft.com/office/powerpoint/2010/main" val="375268755"/>
       </p:ext>
     </p:extLst>
   </p:cSld>
@@ -1505,7 +1505,7 @@
           <p:cNvPr id="2" name="Title 1">
             <a:extLst>
               <a:ext uri="{FF2B5EF4-FFF2-40B4-BE49-F238E27FC236}">
-                <a16:creationId xmlns:a16="http://schemas.microsoft.com/office/drawing/2014/main" id="{5BE32434-53F2-23B2-5BE2-F638FEF05052}"/>
+                <a16:creationId xmlns:a16="http://schemas.microsoft.com/office/drawing/2014/main" id="{A41A7CA9-2ECA-9FDF-EE4C-BA975EDF6FC3}"/>
               </a:ext>
             </a:extLst>
           </p:cNvPr>
@@ -1539,7 +1539,7 @@
           <p:cNvPr id="3" name="Text Placeholder 2">
             <a:extLst>
               <a:ext uri="{FF2B5EF4-FFF2-40B4-BE49-F238E27FC236}">
-                <a16:creationId xmlns:a16="http://schemas.microsoft.com/office/drawing/2014/main" id="{CC56A4EA-2757-EAAA-AD86-7A2E26CC0049}"/>
+                <a16:creationId xmlns:a16="http://schemas.microsoft.com/office/drawing/2014/main" id="{DEE496BB-B5DE-BD96-2CDA-5CE5AC064E61}"/>
               </a:ext>
             </a:extLst>
           </p:cNvPr>
@@ -1610,7 +1610,7 @@
           <p:cNvPr id="4" name="Content Placeholder 3">
             <a:extLst>
               <a:ext uri="{FF2B5EF4-FFF2-40B4-BE49-F238E27FC236}">
-                <a16:creationId xmlns:a16="http://schemas.microsoft.com/office/drawing/2014/main" id="{8F8FF40E-E8B6-FF13-1F51-31E47F5A0CA8}"/>
+                <a16:creationId xmlns:a16="http://schemas.microsoft.com/office/drawing/2014/main" id="{F1793972-0158-5839-DDA0-572656B0AAF9}"/>
               </a:ext>
             </a:extLst>
           </p:cNvPr>
@@ -1673,7 +1673,7 @@
           <p:cNvPr id="5" name="Text Placeholder 4">
             <a:extLst>
               <a:ext uri="{FF2B5EF4-FFF2-40B4-BE49-F238E27FC236}">
-                <a16:creationId xmlns:a16="http://schemas.microsoft.com/office/drawing/2014/main" id="{6A4B4C1A-7E60-9781-AF97-C01BBE31D4E0}"/>
+                <a16:creationId xmlns:a16="http://schemas.microsoft.com/office/drawing/2014/main" id="{3D9C4217-E0E0-F976-0D58-801B3A4E3648}"/>
               </a:ext>
             </a:extLst>
           </p:cNvPr>
@@ -1744,7 +1744,7 @@
           <p:cNvPr id="6" name="Content Placeholder 5">
             <a:extLst>
               <a:ext uri="{FF2B5EF4-FFF2-40B4-BE49-F238E27FC236}">
-                <a16:creationId xmlns:a16="http://schemas.microsoft.com/office/drawing/2014/main" id="{426BD4DB-540C-9FCC-20AC-A08A5136F724}"/>
+                <a16:creationId xmlns:a16="http://schemas.microsoft.com/office/drawing/2014/main" id="{0D4B48C7-002C-288F-39A7-3D1F77BCEF55}"/>
               </a:ext>
             </a:extLst>
           </p:cNvPr>
@@ -1807,7 +1807,7 @@
           <p:cNvPr id="7" name="Date Placeholder 6">
             <a:extLst>
               <a:ext uri="{FF2B5EF4-FFF2-40B4-BE49-F238E27FC236}">
-                <a16:creationId xmlns:a16="http://schemas.microsoft.com/office/drawing/2014/main" id="{4E3D904B-BFE6-E4F8-AEFD-8CD9EA771D70}"/>
+                <a16:creationId xmlns:a16="http://schemas.microsoft.com/office/drawing/2014/main" id="{EF2F7DB4-F528-A437-4C71-3E0545F57DD9}"/>
               </a:ext>
             </a:extLst>
           </p:cNvPr>
@@ -1823,9 +1823,9 @@
           <a:bodyPr/>
           <a:lstStyle/>
           <a:p>
-            <a:fld id="{01C53CDF-468F-F34E-866B-14F3754B9FCD}" type="datetimeFigureOut">
+            <a:fld id="{74B704BF-15E6-864E-815E-8192F4435023}" type="datetimeFigureOut">
               <a:rPr lang="en-US" smtClean="0"/>
-              <a:t>7/20/23</a:t>
+              <a:t>9/17/24</a:t>
             </a:fld>
             <a:endParaRPr lang="en-US"/>
           </a:p>
@@ -1836,7 +1836,7 @@
           <p:cNvPr id="8" name="Footer Placeholder 7">
             <a:extLst>
               <a:ext uri="{FF2B5EF4-FFF2-40B4-BE49-F238E27FC236}">
-                <a16:creationId xmlns:a16="http://schemas.microsoft.com/office/drawing/2014/main" id="{356C770B-00DB-0A00-FD5D-1290617FB723}"/>
+                <a16:creationId xmlns:a16="http://schemas.microsoft.com/office/drawing/2014/main" id="{3BF3223C-F454-2778-86A1-0AB39032C3CB}"/>
               </a:ext>
             </a:extLst>
           </p:cNvPr>
@@ -1861,7 +1861,7 @@
           <p:cNvPr id="9" name="Slide Number Placeholder 8">
             <a:extLst>
               <a:ext uri="{FF2B5EF4-FFF2-40B4-BE49-F238E27FC236}">
-                <a16:creationId xmlns:a16="http://schemas.microsoft.com/office/drawing/2014/main" id="{6C7658D7-7C77-0137-589E-22B100ABACEC}"/>
+                <a16:creationId xmlns:a16="http://schemas.microsoft.com/office/drawing/2014/main" id="{CEC2537E-BABD-0826-D62E-AC7F199FAD53}"/>
               </a:ext>
             </a:extLst>
           </p:cNvPr>
@@ -1877,7 +1877,7 @@
           <a:bodyPr/>
           <a:lstStyle/>
           <a:p>
-            <a:fld id="{61FBC1B1-0FD7-874E-9707-67F6C0BC0DAC}" type="slidenum">
+            <a:fld id="{4835B14C-06B9-7A4B-BA04-7745DB894A13}" type="slidenum">
               <a:rPr lang="en-US" smtClean="0"/>
               <a:t>‹#›</a:t>
             </a:fld>
@@ -1888,7 +1888,7 @@
     </p:spTree>
     <p:extLst>
       <p:ext uri="{BB962C8B-B14F-4D97-AF65-F5344CB8AC3E}">
-        <p14:creationId xmlns:p14="http://schemas.microsoft.com/office/powerpoint/2010/main" val="1659713422"/>
+        <p14:creationId xmlns:p14="http://schemas.microsoft.com/office/powerpoint/2010/main" val="2097755351"/>
       </p:ext>
     </p:extLst>
   </p:cSld>
@@ -1920,7 +1920,7 @@
           <p:cNvPr id="2" name="Title 1">
             <a:extLst>
               <a:ext uri="{FF2B5EF4-FFF2-40B4-BE49-F238E27FC236}">
-                <a16:creationId xmlns:a16="http://schemas.microsoft.com/office/drawing/2014/main" id="{47805887-08DF-1D45-008D-120CE5B5F4AB}"/>
+                <a16:creationId xmlns:a16="http://schemas.microsoft.com/office/drawing/2014/main" id="{BB045B21-5B45-C26F-4B5B-AD2F8D89F897}"/>
               </a:ext>
             </a:extLst>
           </p:cNvPr>
@@ -1949,7 +1949,7 @@
           <p:cNvPr id="3" name="Date Placeholder 2">
             <a:extLst>
               <a:ext uri="{FF2B5EF4-FFF2-40B4-BE49-F238E27FC236}">
-                <a16:creationId xmlns:a16="http://schemas.microsoft.com/office/drawing/2014/main" id="{32B2D5A0-DD86-A938-1AFB-BDD82EBDE09F}"/>
+                <a16:creationId xmlns:a16="http://schemas.microsoft.com/office/drawing/2014/main" id="{89DED7D2-6D92-5947-A359-0BFD36D869D2}"/>
               </a:ext>
             </a:extLst>
           </p:cNvPr>
@@ -1965,9 +1965,9 @@
           <a:bodyPr/>
           <a:lstStyle/>
           <a:p>
-            <a:fld id="{01C53CDF-468F-F34E-866B-14F3754B9FCD}" type="datetimeFigureOut">
+            <a:fld id="{74B704BF-15E6-864E-815E-8192F4435023}" type="datetimeFigureOut">
               <a:rPr lang="en-US" smtClean="0"/>
-              <a:t>7/20/23</a:t>
+              <a:t>9/17/24</a:t>
             </a:fld>
             <a:endParaRPr lang="en-US"/>
           </a:p>
@@ -1978,7 +1978,7 @@
           <p:cNvPr id="4" name="Footer Placeholder 3">
             <a:extLst>
               <a:ext uri="{FF2B5EF4-FFF2-40B4-BE49-F238E27FC236}">
-                <a16:creationId xmlns:a16="http://schemas.microsoft.com/office/drawing/2014/main" id="{A04CA052-FB88-4F0A-374D-1CDE3B8D84D6}"/>
+                <a16:creationId xmlns:a16="http://schemas.microsoft.com/office/drawing/2014/main" id="{740B2898-491A-A9DE-3DB3-208AA59477DB}"/>
               </a:ext>
             </a:extLst>
           </p:cNvPr>
@@ -2003,7 +2003,7 @@
           <p:cNvPr id="5" name="Slide Number Placeholder 4">
             <a:extLst>
               <a:ext uri="{FF2B5EF4-FFF2-40B4-BE49-F238E27FC236}">
-                <a16:creationId xmlns:a16="http://schemas.microsoft.com/office/drawing/2014/main" id="{DE034E9A-3EDA-B6A0-A483-C8C1E655339F}"/>
+                <a16:creationId xmlns:a16="http://schemas.microsoft.com/office/drawing/2014/main" id="{4812FDCB-956F-71BE-E5F6-5A1D512BA3FF}"/>
               </a:ext>
             </a:extLst>
           </p:cNvPr>
@@ -2019,7 +2019,7 @@
           <a:bodyPr/>
           <a:lstStyle/>
           <a:p>
-            <a:fld id="{61FBC1B1-0FD7-874E-9707-67F6C0BC0DAC}" type="slidenum">
+            <a:fld id="{4835B14C-06B9-7A4B-BA04-7745DB894A13}" type="slidenum">
               <a:rPr lang="en-US" smtClean="0"/>
               <a:t>‹#›</a:t>
             </a:fld>
@@ -2030,7 +2030,7 @@
     </p:spTree>
     <p:extLst>
       <p:ext uri="{BB962C8B-B14F-4D97-AF65-F5344CB8AC3E}">
-        <p14:creationId xmlns:p14="http://schemas.microsoft.com/office/powerpoint/2010/main" val="3106621868"/>
+        <p14:creationId xmlns:p14="http://schemas.microsoft.com/office/powerpoint/2010/main" val="3725567252"/>
       </p:ext>
     </p:extLst>
   </p:cSld>
@@ -2062,7 +2062,7 @@
           <p:cNvPr id="2" name="Date Placeholder 1">
             <a:extLst>
               <a:ext uri="{FF2B5EF4-FFF2-40B4-BE49-F238E27FC236}">
-                <a16:creationId xmlns:a16="http://schemas.microsoft.com/office/drawing/2014/main" id="{5B4301BF-68D7-6D69-458E-1A579DC3BC7B}"/>
+                <a16:creationId xmlns:a16="http://schemas.microsoft.com/office/drawing/2014/main" id="{4585F7DF-A73B-E4E4-6B0F-6EA99605C7DE}"/>
               </a:ext>
             </a:extLst>
           </p:cNvPr>
@@ -2078,9 +2078,9 @@
           <a:bodyPr/>
           <a:lstStyle/>
           <a:p>
-            <a:fld id="{01C53CDF-468F-F34E-866B-14F3754B9FCD}" type="datetimeFigureOut">
+            <a:fld id="{74B704BF-15E6-864E-815E-8192F4435023}" type="datetimeFigureOut">
               <a:rPr lang="en-US" smtClean="0"/>
-              <a:t>7/20/23</a:t>
+              <a:t>9/17/24</a:t>
             </a:fld>
             <a:endParaRPr lang="en-US"/>
           </a:p>
@@ -2091,7 +2091,7 @@
           <p:cNvPr id="3" name="Footer Placeholder 2">
             <a:extLst>
               <a:ext uri="{FF2B5EF4-FFF2-40B4-BE49-F238E27FC236}">
-                <a16:creationId xmlns:a16="http://schemas.microsoft.com/office/drawing/2014/main" id="{E5940F82-5B27-CE7B-841A-0F8BD8C6E98F}"/>
+                <a16:creationId xmlns:a16="http://schemas.microsoft.com/office/drawing/2014/main" id="{06C81B54-D076-8A3E-EA7A-B77562BA97D4}"/>
               </a:ext>
             </a:extLst>
           </p:cNvPr>
@@ -2116,7 +2116,7 @@
           <p:cNvPr id="4" name="Slide Number Placeholder 3">
             <a:extLst>
               <a:ext uri="{FF2B5EF4-FFF2-40B4-BE49-F238E27FC236}">
-                <a16:creationId xmlns:a16="http://schemas.microsoft.com/office/drawing/2014/main" id="{D3045E00-0F81-0A59-EB24-EA6269F12E1D}"/>
+                <a16:creationId xmlns:a16="http://schemas.microsoft.com/office/drawing/2014/main" id="{4E1570A6-ED1A-B855-8C1C-1D2966C4DDE3}"/>
               </a:ext>
             </a:extLst>
           </p:cNvPr>
@@ -2132,7 +2132,7 @@
           <a:bodyPr/>
           <a:lstStyle/>
           <a:p>
-            <a:fld id="{61FBC1B1-0FD7-874E-9707-67F6C0BC0DAC}" type="slidenum">
+            <a:fld id="{4835B14C-06B9-7A4B-BA04-7745DB894A13}" type="slidenum">
               <a:rPr lang="en-US" smtClean="0"/>
               <a:t>‹#›</a:t>
             </a:fld>
@@ -2143,7 +2143,7 @@
     </p:spTree>
     <p:extLst>
       <p:ext uri="{BB962C8B-B14F-4D97-AF65-F5344CB8AC3E}">
-        <p14:creationId xmlns:p14="http://schemas.microsoft.com/office/powerpoint/2010/main" val="74893966"/>
+        <p14:creationId xmlns:p14="http://schemas.microsoft.com/office/powerpoint/2010/main" val="403205635"/>
       </p:ext>
     </p:extLst>
   </p:cSld>
@@ -2175,7 +2175,7 @@
           <p:cNvPr id="2" name="Title 1">
             <a:extLst>
               <a:ext uri="{FF2B5EF4-FFF2-40B4-BE49-F238E27FC236}">
-                <a16:creationId xmlns:a16="http://schemas.microsoft.com/office/drawing/2014/main" id="{2CC7E309-F260-7649-DE64-6EF09C0DF0BB}"/>
+                <a16:creationId xmlns:a16="http://schemas.microsoft.com/office/drawing/2014/main" id="{F07ABB64-131C-2929-D72F-F901ED63C501}"/>
               </a:ext>
             </a:extLst>
           </p:cNvPr>
@@ -2213,7 +2213,7 @@
           <p:cNvPr id="3" name="Content Placeholder 2">
             <a:extLst>
               <a:ext uri="{FF2B5EF4-FFF2-40B4-BE49-F238E27FC236}">
-                <a16:creationId xmlns:a16="http://schemas.microsoft.com/office/drawing/2014/main" id="{1B9B08A7-1E97-F547-D08D-4F1D8615C514}"/>
+                <a16:creationId xmlns:a16="http://schemas.microsoft.com/office/drawing/2014/main" id="{16079DE2-5C8F-6A81-0C8C-7B14C46EADAE}"/>
               </a:ext>
             </a:extLst>
           </p:cNvPr>
@@ -2304,7 +2304,7 @@
           <p:cNvPr id="4" name="Text Placeholder 3">
             <a:extLst>
               <a:ext uri="{FF2B5EF4-FFF2-40B4-BE49-F238E27FC236}">
-                <a16:creationId xmlns:a16="http://schemas.microsoft.com/office/drawing/2014/main" id="{9AE2AE34-8C25-7475-8DFB-97439A684361}"/>
+                <a16:creationId xmlns:a16="http://schemas.microsoft.com/office/drawing/2014/main" id="{46E7B84A-85D9-B09C-0664-F45C334813EA}"/>
               </a:ext>
             </a:extLst>
           </p:cNvPr>
@@ -2375,7 +2375,7 @@
           <p:cNvPr id="5" name="Date Placeholder 4">
             <a:extLst>
               <a:ext uri="{FF2B5EF4-FFF2-40B4-BE49-F238E27FC236}">
-                <a16:creationId xmlns:a16="http://schemas.microsoft.com/office/drawing/2014/main" id="{22830321-7237-C1E8-993C-A6478119900E}"/>
+                <a16:creationId xmlns:a16="http://schemas.microsoft.com/office/drawing/2014/main" id="{26CBED0A-6B77-EAEB-F126-8679DEAC2E01}"/>
               </a:ext>
             </a:extLst>
           </p:cNvPr>
@@ -2391,9 +2391,9 @@
           <a:bodyPr/>
           <a:lstStyle/>
           <a:p>
-            <a:fld id="{01C53CDF-468F-F34E-866B-14F3754B9FCD}" type="datetimeFigureOut">
+            <a:fld id="{74B704BF-15E6-864E-815E-8192F4435023}" type="datetimeFigureOut">
               <a:rPr lang="en-US" smtClean="0"/>
-              <a:t>7/20/23</a:t>
+              <a:t>9/17/24</a:t>
             </a:fld>
             <a:endParaRPr lang="en-US"/>
           </a:p>
@@ -2404,7 +2404,7 @@
           <p:cNvPr id="6" name="Footer Placeholder 5">
             <a:extLst>
               <a:ext uri="{FF2B5EF4-FFF2-40B4-BE49-F238E27FC236}">
-                <a16:creationId xmlns:a16="http://schemas.microsoft.com/office/drawing/2014/main" id="{9E304CF8-207E-1476-5A67-26C4D5977821}"/>
+                <a16:creationId xmlns:a16="http://schemas.microsoft.com/office/drawing/2014/main" id="{4092E58C-82CB-CC91-3B02-D6BF62208D6D}"/>
               </a:ext>
             </a:extLst>
           </p:cNvPr>
@@ -2429,7 +2429,7 @@
           <p:cNvPr id="7" name="Slide Number Placeholder 6">
             <a:extLst>
               <a:ext uri="{FF2B5EF4-FFF2-40B4-BE49-F238E27FC236}">
-                <a16:creationId xmlns:a16="http://schemas.microsoft.com/office/drawing/2014/main" id="{10947884-0478-2BF1-1BE7-E30AE26B35FA}"/>
+                <a16:creationId xmlns:a16="http://schemas.microsoft.com/office/drawing/2014/main" id="{827C8213-8FA8-5850-3396-77B60D6A7426}"/>
               </a:ext>
             </a:extLst>
           </p:cNvPr>
@@ -2445,7 +2445,7 @@
           <a:bodyPr/>
           <a:lstStyle/>
           <a:p>
-            <a:fld id="{61FBC1B1-0FD7-874E-9707-67F6C0BC0DAC}" type="slidenum">
+            <a:fld id="{4835B14C-06B9-7A4B-BA04-7745DB894A13}" type="slidenum">
               <a:rPr lang="en-US" smtClean="0"/>
               <a:t>‹#›</a:t>
             </a:fld>
@@ -2456,7 +2456,7 @@
     </p:spTree>
     <p:extLst>
       <p:ext uri="{BB962C8B-B14F-4D97-AF65-F5344CB8AC3E}">
-        <p14:creationId xmlns:p14="http://schemas.microsoft.com/office/powerpoint/2010/main" val="3496999409"/>
+        <p14:creationId xmlns:p14="http://schemas.microsoft.com/office/powerpoint/2010/main" val="2291598979"/>
       </p:ext>
     </p:extLst>
   </p:cSld>
@@ -2488,7 +2488,7 @@
           <p:cNvPr id="2" name="Title 1">
             <a:extLst>
               <a:ext uri="{FF2B5EF4-FFF2-40B4-BE49-F238E27FC236}">
-                <a16:creationId xmlns:a16="http://schemas.microsoft.com/office/drawing/2014/main" id="{96FD45C5-E0CF-79B9-95A2-6D2A83D379A0}"/>
+                <a16:creationId xmlns:a16="http://schemas.microsoft.com/office/drawing/2014/main" id="{BD0F6AA1-8E65-B8F6-7C4B-BA30975BEE08}"/>
               </a:ext>
             </a:extLst>
           </p:cNvPr>
@@ -2526,7 +2526,7 @@
           <p:cNvPr id="3" name="Picture Placeholder 2">
             <a:extLst>
               <a:ext uri="{FF2B5EF4-FFF2-40B4-BE49-F238E27FC236}">
-                <a16:creationId xmlns:a16="http://schemas.microsoft.com/office/drawing/2014/main" id="{595972AE-B077-0283-7C41-73109C3FC8B1}"/>
+                <a16:creationId xmlns:a16="http://schemas.microsoft.com/office/drawing/2014/main" id="{81AEB93F-7913-A55B-C184-9C5F798CDA99}"/>
               </a:ext>
             </a:extLst>
           </p:cNvPr>
@@ -2593,7 +2593,7 @@
           <p:cNvPr id="4" name="Text Placeholder 3">
             <a:extLst>
               <a:ext uri="{FF2B5EF4-FFF2-40B4-BE49-F238E27FC236}">
-                <a16:creationId xmlns:a16="http://schemas.microsoft.com/office/drawing/2014/main" id="{4AB685E3-8272-958A-B4CC-AA1BD01AF1D2}"/>
+                <a16:creationId xmlns:a16="http://schemas.microsoft.com/office/drawing/2014/main" id="{D17DF3FA-0239-A57C-80E0-FAAB2CD8CCCB}"/>
               </a:ext>
             </a:extLst>
           </p:cNvPr>
@@ -2664,7 +2664,7 @@
           <p:cNvPr id="5" name="Date Placeholder 4">
             <a:extLst>
               <a:ext uri="{FF2B5EF4-FFF2-40B4-BE49-F238E27FC236}">
-                <a16:creationId xmlns:a16="http://schemas.microsoft.com/office/drawing/2014/main" id="{148A649F-2542-B3D6-A055-26EEE996B5F2}"/>
+                <a16:creationId xmlns:a16="http://schemas.microsoft.com/office/drawing/2014/main" id="{95B9B931-CE76-8BD2-C70B-705F47C4DA53}"/>
               </a:ext>
             </a:extLst>
           </p:cNvPr>
@@ -2680,9 +2680,9 @@
           <a:bodyPr/>
           <a:lstStyle/>
           <a:p>
-            <a:fld id="{01C53CDF-468F-F34E-866B-14F3754B9FCD}" type="datetimeFigureOut">
+            <a:fld id="{74B704BF-15E6-864E-815E-8192F4435023}" type="datetimeFigureOut">
               <a:rPr lang="en-US" smtClean="0"/>
-              <a:t>7/20/23</a:t>
+              <a:t>9/17/24</a:t>
             </a:fld>
             <a:endParaRPr lang="en-US"/>
           </a:p>
@@ -2693,7 +2693,7 @@
           <p:cNvPr id="6" name="Footer Placeholder 5">
             <a:extLst>
               <a:ext uri="{FF2B5EF4-FFF2-40B4-BE49-F238E27FC236}">
-                <a16:creationId xmlns:a16="http://schemas.microsoft.com/office/drawing/2014/main" id="{9D76B7E0-AD5C-2C3B-BC37-743D53103C82}"/>
+                <a16:creationId xmlns:a16="http://schemas.microsoft.com/office/drawing/2014/main" id="{6E0F2057-8CE8-15DF-2B72-8302DDE83BE9}"/>
               </a:ext>
             </a:extLst>
           </p:cNvPr>
@@ -2718,7 +2718,7 @@
           <p:cNvPr id="7" name="Slide Number Placeholder 6">
             <a:extLst>
               <a:ext uri="{FF2B5EF4-FFF2-40B4-BE49-F238E27FC236}">
-                <a16:creationId xmlns:a16="http://schemas.microsoft.com/office/drawing/2014/main" id="{DC3E5C1D-3FFE-4531-99D9-91162815DAA8}"/>
+                <a16:creationId xmlns:a16="http://schemas.microsoft.com/office/drawing/2014/main" id="{BA81A283-E973-82D3-440F-74AFF8AC0E99}"/>
               </a:ext>
             </a:extLst>
           </p:cNvPr>
@@ -2734,7 +2734,7 @@
           <a:bodyPr/>
           <a:lstStyle/>
           <a:p>
-            <a:fld id="{61FBC1B1-0FD7-874E-9707-67F6C0BC0DAC}" type="slidenum">
+            <a:fld id="{4835B14C-06B9-7A4B-BA04-7745DB894A13}" type="slidenum">
               <a:rPr lang="en-US" smtClean="0"/>
               <a:t>‹#›</a:t>
             </a:fld>
@@ -2745,7 +2745,7 @@
     </p:spTree>
     <p:extLst>
       <p:ext uri="{BB962C8B-B14F-4D97-AF65-F5344CB8AC3E}">
-        <p14:creationId xmlns:p14="http://schemas.microsoft.com/office/powerpoint/2010/main" val="2284445526"/>
+        <p14:creationId xmlns:p14="http://schemas.microsoft.com/office/powerpoint/2010/main" val="1563468581"/>
       </p:ext>
     </p:extLst>
   </p:cSld>
@@ -2782,7 +2782,7 @@
           <p:cNvPr id="2" name="Title Placeholder 1">
             <a:extLst>
               <a:ext uri="{FF2B5EF4-FFF2-40B4-BE49-F238E27FC236}">
-                <a16:creationId xmlns:a16="http://schemas.microsoft.com/office/drawing/2014/main" id="{C661BC92-52C5-8D82-639F-77DD41D4E020}"/>
+                <a16:creationId xmlns:a16="http://schemas.microsoft.com/office/drawing/2014/main" id="{97FD85C7-AFD8-1F1D-BEC2-66914567A455}"/>
               </a:ext>
             </a:extLst>
           </p:cNvPr>
@@ -2821,7 +2821,7 @@
           <p:cNvPr id="3" name="Text Placeholder 2">
             <a:extLst>
               <a:ext uri="{FF2B5EF4-FFF2-40B4-BE49-F238E27FC236}">
-                <a16:creationId xmlns:a16="http://schemas.microsoft.com/office/drawing/2014/main" id="{6807F4EA-CA6C-1E4B-C0F9-55886EA71332}"/>
+                <a16:creationId xmlns:a16="http://schemas.microsoft.com/office/drawing/2014/main" id="{024E6851-E134-9309-DBDB-FFBE05630B9F}"/>
               </a:ext>
             </a:extLst>
           </p:cNvPr>
@@ -2889,7 +2889,7 @@
           <p:cNvPr id="4" name="Date Placeholder 3">
             <a:extLst>
               <a:ext uri="{FF2B5EF4-FFF2-40B4-BE49-F238E27FC236}">
-                <a16:creationId xmlns:a16="http://schemas.microsoft.com/office/drawing/2014/main" id="{FC805BF9-C6A6-33B6-8A2A-9868254555C5}"/>
+                <a16:creationId xmlns:a16="http://schemas.microsoft.com/office/drawing/2014/main" id="{F15621C8-BBA1-6003-3CB5-595504C9B89C}"/>
               </a:ext>
             </a:extLst>
           </p:cNvPr>
@@ -2916,16 +2916,16 @@
               <a:defRPr sz="1200">
                 <a:solidFill>
                   <a:schemeClr val="tx1">
-                    <a:tint val="75000"/>
+                    <a:tint val="82000"/>
                   </a:schemeClr>
                 </a:solidFill>
               </a:defRPr>
             </a:lvl1pPr>
           </a:lstStyle>
           <a:p>
-            <a:fld id="{01C53CDF-468F-F34E-866B-14F3754B9FCD}" type="datetimeFigureOut">
+            <a:fld id="{74B704BF-15E6-864E-815E-8192F4435023}" type="datetimeFigureOut">
               <a:rPr lang="en-US" smtClean="0"/>
-              <a:t>7/20/23</a:t>
+              <a:t>9/17/24</a:t>
             </a:fld>
             <a:endParaRPr lang="en-US"/>
           </a:p>
@@ -2936,7 +2936,7 @@
           <p:cNvPr id="5" name="Footer Placeholder 4">
             <a:extLst>
               <a:ext uri="{FF2B5EF4-FFF2-40B4-BE49-F238E27FC236}">
-                <a16:creationId xmlns:a16="http://schemas.microsoft.com/office/drawing/2014/main" id="{A0C2BD2A-877F-4542-7742-1E2C7F0D5802}"/>
+                <a16:creationId xmlns:a16="http://schemas.microsoft.com/office/drawing/2014/main" id="{DF3909D3-A71D-B3AA-3D53-8FF92E2ED1B2}"/>
               </a:ext>
             </a:extLst>
           </p:cNvPr>
@@ -2963,7 +2963,7 @@
               <a:defRPr sz="1200">
                 <a:solidFill>
                   <a:schemeClr val="tx1">
-                    <a:tint val="75000"/>
+                    <a:tint val="82000"/>
                   </a:schemeClr>
                 </a:solidFill>
               </a:defRPr>
@@ -2979,7 +2979,7 @@
           <p:cNvPr id="6" name="Slide Number Placeholder 5">
             <a:extLst>
               <a:ext uri="{FF2B5EF4-FFF2-40B4-BE49-F238E27FC236}">
-                <a16:creationId xmlns:a16="http://schemas.microsoft.com/office/drawing/2014/main" id="{336AE13D-BF8D-5EE6-5F2F-8724436E19C0}"/>
+                <a16:creationId xmlns:a16="http://schemas.microsoft.com/office/drawing/2014/main" id="{C25884CE-1093-9393-433B-585CEC2D5A86}"/>
               </a:ext>
             </a:extLst>
           </p:cNvPr>
@@ -3006,14 +3006,14 @@
               <a:defRPr sz="1200">
                 <a:solidFill>
                   <a:schemeClr val="tx1">
-                    <a:tint val="75000"/>
+                    <a:tint val="82000"/>
                   </a:schemeClr>
                 </a:solidFill>
               </a:defRPr>
             </a:lvl1pPr>
           </a:lstStyle>
           <a:p>
-            <a:fld id="{61FBC1B1-0FD7-874E-9707-67F6C0BC0DAC}" type="slidenum">
+            <a:fld id="{4835B14C-06B9-7A4B-BA04-7745DB894A13}" type="slidenum">
               <a:rPr lang="en-US" smtClean="0"/>
               <a:t>‹#›</a:t>
             </a:fld>
@@ -3024,7 +3024,7 @@
     </p:spTree>
     <p:extLst>
       <p:ext uri="{BB962C8B-B14F-4D97-AF65-F5344CB8AC3E}">
-        <p14:creationId xmlns:p14="http://schemas.microsoft.com/office/powerpoint/2010/main" val="467614670"/>
+        <p14:creationId xmlns:p14="http://schemas.microsoft.com/office/powerpoint/2010/main" val="2140542558"/>
       </p:ext>
     </p:extLst>
   </p:cSld>
@@ -3342,479 +3342,40 @@
           <a:chExt cx="0" cy="0"/>
         </a:xfrm>
       </p:grpSpPr>
-      <p:grpSp>
-        <p:nvGrpSpPr>
-          <p:cNvPr id="37" name="Group 36">
-            <a:extLst>
-              <a:ext uri="{FF2B5EF4-FFF2-40B4-BE49-F238E27FC236}">
-                <a16:creationId xmlns:a16="http://schemas.microsoft.com/office/drawing/2014/main" id="{63AAFAFE-AE79-8A9F-23A0-6F450255994E}"/>
-              </a:ext>
-            </a:extLst>
-          </p:cNvPr>
-          <p:cNvGrpSpPr/>
+      <p:pic>
+        <p:nvPicPr>
+          <p:cNvPr id="4" name="Picture 3">
+            <a:extLst>
+              <a:ext uri="{FF2B5EF4-FFF2-40B4-BE49-F238E27FC236}">
+                <a16:creationId xmlns:a16="http://schemas.microsoft.com/office/drawing/2014/main" id="{A778A252-9BA2-9A46-55D5-41CB21145471}"/>
+              </a:ext>
+            </a:extLst>
+          </p:cNvPr>
+          <p:cNvPicPr>
+            <a:picLocks noChangeAspect="1"/>
+          </p:cNvPicPr>
           <p:nvPr/>
-        </p:nvGrpSpPr>
-        <p:grpSpPr>
+        </p:nvPicPr>
+        <p:blipFill>
+          <a:blip r:embed="rId2"/>
+          <a:stretch>
+            <a:fillRect/>
+          </a:stretch>
+        </p:blipFill>
+        <p:spPr>
           <a:xfrm>
-            <a:off x="0" y="0"/>
-            <a:ext cx="12192000" cy="6858000"/>
-            <a:chOff x="0" y="0"/>
-            <a:chExt cx="12192000" cy="6858000"/>
+            <a:off x="522444" y="1091046"/>
+            <a:ext cx="11147111" cy="5066867"/>
           </a:xfrm>
-        </p:grpSpPr>
-        <p:sp>
-          <p:nvSpPr>
-            <p:cNvPr id="36" name="Rectangle 35">
-              <a:extLst>
-                <a:ext uri="{FF2B5EF4-FFF2-40B4-BE49-F238E27FC236}">
-                  <a16:creationId xmlns:a16="http://schemas.microsoft.com/office/drawing/2014/main" id="{E1E608ED-FA66-53C0-F15C-729CBCE75809}"/>
-                </a:ext>
-              </a:extLst>
-            </p:cNvPr>
-            <p:cNvSpPr/>
-            <p:nvPr/>
-          </p:nvSpPr>
-          <p:spPr>
-            <a:xfrm>
-              <a:off x="0" y="0"/>
-              <a:ext cx="12192000" cy="6858000"/>
-            </a:xfrm>
-            <a:prstGeom prst="rect">
-              <a:avLst/>
-            </a:prstGeom>
-            <a:solidFill>
-              <a:schemeClr val="bg1"/>
-            </a:solidFill>
-            <a:ln>
-              <a:noFill/>
-            </a:ln>
-          </p:spPr>
-          <p:style>
-            <a:lnRef idx="2">
-              <a:schemeClr val="accent1">
-                <a:shade val="15000"/>
-              </a:schemeClr>
-            </a:lnRef>
-            <a:fillRef idx="1">
-              <a:schemeClr val="accent1"/>
-            </a:fillRef>
-            <a:effectRef idx="0">
-              <a:schemeClr val="accent1"/>
-            </a:effectRef>
-            <a:fontRef idx="minor">
-              <a:schemeClr val="lt1"/>
-            </a:fontRef>
-          </p:style>
-          <p:txBody>
-            <a:bodyPr rtlCol="0" anchor="ctr"/>
-            <a:lstStyle/>
-            <a:p>
-              <a:pPr algn="ctr"/>
-              <a:endParaRPr lang="en-US"/>
-            </a:p>
-          </p:txBody>
-        </p:sp>
-        <p:pic>
-          <p:nvPicPr>
-            <p:cNvPr id="22" name="Picture 21">
-              <a:extLst>
-                <a:ext uri="{FF2B5EF4-FFF2-40B4-BE49-F238E27FC236}">
-                  <a16:creationId xmlns:a16="http://schemas.microsoft.com/office/drawing/2014/main" id="{F509D2BE-9F22-0251-5A92-AE0A5C100F02}"/>
-                </a:ext>
-              </a:extLst>
-            </p:cNvPr>
-            <p:cNvPicPr>
-              <a:picLocks noChangeAspect="1"/>
-            </p:cNvPicPr>
-            <p:nvPr/>
-          </p:nvPicPr>
-          <p:blipFill>
-            <a:blip r:embed="rId2"/>
-            <a:stretch>
-              <a:fillRect/>
-            </a:stretch>
-          </p:blipFill>
-          <p:spPr>
-            <a:xfrm>
-              <a:off x="407125" y="104192"/>
-              <a:ext cx="11636830" cy="6649616"/>
-            </a:xfrm>
-            <a:prstGeom prst="rect">
-              <a:avLst/>
-            </a:prstGeom>
-          </p:spPr>
-        </p:pic>
-        <p:cxnSp>
-          <p:nvCxnSpPr>
-            <p:cNvPr id="24" name="Straight Connector 23">
-              <a:extLst>
-                <a:ext uri="{FF2B5EF4-FFF2-40B4-BE49-F238E27FC236}">
-                  <a16:creationId xmlns:a16="http://schemas.microsoft.com/office/drawing/2014/main" id="{65242B09-5D0A-240B-62AB-5E55C266E160}"/>
-                </a:ext>
-              </a:extLst>
-            </p:cNvPr>
-            <p:cNvCxnSpPr/>
-            <p:nvPr/>
-          </p:nvCxnSpPr>
-          <p:spPr>
-            <a:xfrm>
-              <a:off x="2155371" y="3631474"/>
-              <a:ext cx="0" cy="1489166"/>
-            </a:xfrm>
-            <a:prstGeom prst="line">
-              <a:avLst/>
-            </a:prstGeom>
-            <a:ln w="85725">
-              <a:solidFill>
-                <a:schemeClr val="bg1">
-                  <a:alpha val="70914"/>
-                </a:schemeClr>
-              </a:solidFill>
-              <a:prstDash val="dash"/>
-            </a:ln>
-          </p:spPr>
-          <p:style>
-            <a:lnRef idx="1">
-              <a:schemeClr val="accent1"/>
-            </a:lnRef>
-            <a:fillRef idx="0">
-              <a:schemeClr val="accent1"/>
-            </a:fillRef>
-            <a:effectRef idx="0">
-              <a:schemeClr val="accent1"/>
-            </a:effectRef>
-            <a:fontRef idx="minor">
-              <a:schemeClr val="tx1"/>
-            </a:fontRef>
-          </p:style>
-        </p:cxnSp>
-        <p:cxnSp>
-          <p:nvCxnSpPr>
-            <p:cNvPr id="25" name="Straight Connector 24">
-              <a:extLst>
-                <a:ext uri="{FF2B5EF4-FFF2-40B4-BE49-F238E27FC236}">
-                  <a16:creationId xmlns:a16="http://schemas.microsoft.com/office/drawing/2014/main" id="{47AC4596-60DF-2499-2425-B67A36195728}"/>
-                </a:ext>
-              </a:extLst>
-            </p:cNvPr>
-            <p:cNvCxnSpPr>
-              <a:cxnSpLocks/>
-            </p:cNvCxnSpPr>
-            <p:nvPr/>
-          </p:nvCxnSpPr>
-          <p:spPr>
-            <a:xfrm>
-              <a:off x="3248297" y="3143794"/>
-              <a:ext cx="0" cy="1820092"/>
-            </a:xfrm>
-            <a:prstGeom prst="line">
-              <a:avLst/>
-            </a:prstGeom>
-            <a:ln w="85725">
-              <a:solidFill>
-                <a:schemeClr val="bg1">
-                  <a:alpha val="70914"/>
-                </a:schemeClr>
-              </a:solidFill>
-              <a:prstDash val="dash"/>
-            </a:ln>
-          </p:spPr>
-          <p:style>
-            <a:lnRef idx="1">
-              <a:schemeClr val="accent1"/>
-            </a:lnRef>
-            <a:fillRef idx="0">
-              <a:schemeClr val="accent1"/>
-            </a:fillRef>
-            <a:effectRef idx="0">
-              <a:schemeClr val="accent1"/>
-            </a:effectRef>
-            <a:fontRef idx="minor">
-              <a:schemeClr val="tx1"/>
-            </a:fontRef>
-          </p:style>
-        </p:cxnSp>
-        <p:cxnSp>
-          <p:nvCxnSpPr>
-            <p:cNvPr id="27" name="Straight Connector 26">
-              <a:extLst>
-                <a:ext uri="{FF2B5EF4-FFF2-40B4-BE49-F238E27FC236}">
-                  <a16:creationId xmlns:a16="http://schemas.microsoft.com/office/drawing/2014/main" id="{F30065D7-B9FF-076A-4BC0-3989029A1AAF}"/>
-                </a:ext>
-              </a:extLst>
-            </p:cNvPr>
-            <p:cNvCxnSpPr>
-              <a:cxnSpLocks/>
-            </p:cNvCxnSpPr>
-            <p:nvPr/>
-          </p:nvCxnSpPr>
-          <p:spPr>
-            <a:xfrm>
-              <a:off x="4341223" y="3143794"/>
-              <a:ext cx="0" cy="1820092"/>
-            </a:xfrm>
-            <a:prstGeom prst="line">
-              <a:avLst/>
-            </a:prstGeom>
-            <a:ln w="85725">
-              <a:solidFill>
-                <a:schemeClr val="bg1">
-                  <a:alpha val="70914"/>
-                </a:schemeClr>
-              </a:solidFill>
-              <a:prstDash val="dash"/>
-            </a:ln>
-          </p:spPr>
-          <p:style>
-            <a:lnRef idx="1">
-              <a:schemeClr val="accent1"/>
-            </a:lnRef>
-            <a:fillRef idx="0">
-              <a:schemeClr val="accent1"/>
-            </a:fillRef>
-            <a:effectRef idx="0">
-              <a:schemeClr val="accent1"/>
-            </a:effectRef>
-            <a:fontRef idx="minor">
-              <a:schemeClr val="tx1"/>
-            </a:fontRef>
-          </p:style>
-        </p:cxnSp>
-        <p:cxnSp>
-          <p:nvCxnSpPr>
-            <p:cNvPr id="28" name="Straight Connector 27">
-              <a:extLst>
-                <a:ext uri="{FF2B5EF4-FFF2-40B4-BE49-F238E27FC236}">
-                  <a16:creationId xmlns:a16="http://schemas.microsoft.com/office/drawing/2014/main" id="{963ADF60-8580-EBBC-6F04-345C641DF445}"/>
-                </a:ext>
-              </a:extLst>
-            </p:cNvPr>
-            <p:cNvCxnSpPr>
-              <a:cxnSpLocks/>
-            </p:cNvCxnSpPr>
-            <p:nvPr/>
-          </p:nvCxnSpPr>
-          <p:spPr>
-            <a:xfrm>
-              <a:off x="5434149" y="3570514"/>
-              <a:ext cx="0" cy="1820092"/>
-            </a:xfrm>
-            <a:prstGeom prst="line">
-              <a:avLst/>
-            </a:prstGeom>
-            <a:ln w="85725">
-              <a:solidFill>
-                <a:schemeClr val="bg1">
-                  <a:alpha val="70914"/>
-                </a:schemeClr>
-              </a:solidFill>
-              <a:prstDash val="dash"/>
-            </a:ln>
-          </p:spPr>
-          <p:style>
-            <a:lnRef idx="1">
-              <a:schemeClr val="accent1"/>
-            </a:lnRef>
-            <a:fillRef idx="0">
-              <a:schemeClr val="accent1"/>
-            </a:fillRef>
-            <a:effectRef idx="0">
-              <a:schemeClr val="accent1"/>
-            </a:effectRef>
-            <a:fontRef idx="minor">
-              <a:schemeClr val="tx1"/>
-            </a:fontRef>
-          </p:style>
-        </p:cxnSp>
-        <p:cxnSp>
-          <p:nvCxnSpPr>
-            <p:cNvPr id="29" name="Straight Connector 28">
-              <a:extLst>
-                <a:ext uri="{FF2B5EF4-FFF2-40B4-BE49-F238E27FC236}">
-                  <a16:creationId xmlns:a16="http://schemas.microsoft.com/office/drawing/2014/main" id="{9C0A017F-C02A-27B4-67AA-D391FA9E0E59}"/>
-                </a:ext>
-              </a:extLst>
-            </p:cNvPr>
-            <p:cNvCxnSpPr>
-              <a:cxnSpLocks/>
-            </p:cNvCxnSpPr>
-            <p:nvPr/>
-          </p:nvCxnSpPr>
-          <p:spPr>
-            <a:xfrm>
-              <a:off x="7837714" y="3008811"/>
-              <a:ext cx="0" cy="2569029"/>
-            </a:xfrm>
-            <a:prstGeom prst="line">
-              <a:avLst/>
-            </a:prstGeom>
-            <a:ln w="85725">
-              <a:solidFill>
-                <a:schemeClr val="bg1">
-                  <a:alpha val="70914"/>
-                </a:schemeClr>
-              </a:solidFill>
-              <a:prstDash val="dash"/>
-            </a:ln>
-          </p:spPr>
-          <p:style>
-            <a:lnRef idx="1">
-              <a:schemeClr val="accent1"/>
-            </a:lnRef>
-            <a:fillRef idx="0">
-              <a:schemeClr val="accent1"/>
-            </a:fillRef>
-            <a:effectRef idx="0">
-              <a:schemeClr val="accent1"/>
-            </a:effectRef>
-            <a:fontRef idx="minor">
-              <a:schemeClr val="tx1"/>
-            </a:fontRef>
-          </p:style>
-        </p:cxnSp>
-        <p:cxnSp>
-          <p:nvCxnSpPr>
-            <p:cNvPr id="31" name="Straight Connector 30">
-              <a:extLst>
-                <a:ext uri="{FF2B5EF4-FFF2-40B4-BE49-F238E27FC236}">
-                  <a16:creationId xmlns:a16="http://schemas.microsoft.com/office/drawing/2014/main" id="{784AEC21-43B3-1DDC-05A5-3A096D7F7366}"/>
-                </a:ext>
-              </a:extLst>
-            </p:cNvPr>
-            <p:cNvCxnSpPr>
-              <a:cxnSpLocks/>
-            </p:cNvCxnSpPr>
-            <p:nvPr/>
-          </p:nvCxnSpPr>
-          <p:spPr>
-            <a:xfrm>
-              <a:off x="8969829" y="3008811"/>
-              <a:ext cx="0" cy="2686595"/>
-            </a:xfrm>
-            <a:prstGeom prst="line">
-              <a:avLst/>
-            </a:prstGeom>
-            <a:ln w="85725">
-              <a:solidFill>
-                <a:schemeClr val="bg1">
-                  <a:alpha val="70914"/>
-                </a:schemeClr>
-              </a:solidFill>
-              <a:prstDash val="dash"/>
-            </a:ln>
-          </p:spPr>
-          <p:style>
-            <a:lnRef idx="1">
-              <a:schemeClr val="accent1"/>
-            </a:lnRef>
-            <a:fillRef idx="0">
-              <a:schemeClr val="accent1"/>
-            </a:fillRef>
-            <a:effectRef idx="0">
-              <a:schemeClr val="accent1"/>
-            </a:effectRef>
-            <a:fontRef idx="minor">
-              <a:schemeClr val="tx1"/>
-            </a:fontRef>
-          </p:style>
-        </p:cxnSp>
-        <p:cxnSp>
-          <p:nvCxnSpPr>
-            <p:cNvPr id="33" name="Straight Connector 32">
-              <a:extLst>
-                <a:ext uri="{FF2B5EF4-FFF2-40B4-BE49-F238E27FC236}">
-                  <a16:creationId xmlns:a16="http://schemas.microsoft.com/office/drawing/2014/main" id="{F20FA699-1E05-CE7A-4A38-32DD5C66A9A9}"/>
-                </a:ext>
-              </a:extLst>
-            </p:cNvPr>
-            <p:cNvCxnSpPr>
-              <a:cxnSpLocks/>
-            </p:cNvCxnSpPr>
-            <p:nvPr/>
-          </p:nvCxnSpPr>
-          <p:spPr>
-            <a:xfrm>
-              <a:off x="10101944" y="2704011"/>
-              <a:ext cx="0" cy="2686595"/>
-            </a:xfrm>
-            <a:prstGeom prst="line">
-              <a:avLst/>
-            </a:prstGeom>
-            <a:ln w="85725">
-              <a:solidFill>
-                <a:schemeClr val="bg1">
-                  <a:alpha val="70914"/>
-                </a:schemeClr>
-              </a:solidFill>
-              <a:prstDash val="dash"/>
-            </a:ln>
-          </p:spPr>
-          <p:style>
-            <a:lnRef idx="1">
-              <a:schemeClr val="accent1"/>
-            </a:lnRef>
-            <a:fillRef idx="0">
-              <a:schemeClr val="accent1"/>
-            </a:fillRef>
-            <a:effectRef idx="0">
-              <a:schemeClr val="accent1"/>
-            </a:effectRef>
-            <a:fontRef idx="minor">
-              <a:schemeClr val="tx1"/>
-            </a:fontRef>
-          </p:style>
-        </p:cxnSp>
-        <p:cxnSp>
-          <p:nvCxnSpPr>
-            <p:cNvPr id="34" name="Straight Connector 33">
-              <a:extLst>
-                <a:ext uri="{FF2B5EF4-FFF2-40B4-BE49-F238E27FC236}">
-                  <a16:creationId xmlns:a16="http://schemas.microsoft.com/office/drawing/2014/main" id="{AF6D65B5-3D69-EEBB-5DE5-1420CD8CF15E}"/>
-                </a:ext>
-              </a:extLst>
-            </p:cNvPr>
-            <p:cNvCxnSpPr>
-              <a:cxnSpLocks/>
-            </p:cNvCxnSpPr>
-            <p:nvPr/>
-          </p:nvCxnSpPr>
-          <p:spPr>
-            <a:xfrm>
-              <a:off x="11234058" y="3143794"/>
-              <a:ext cx="0" cy="2551612"/>
-            </a:xfrm>
-            <a:prstGeom prst="line">
-              <a:avLst/>
-            </a:prstGeom>
-            <a:ln w="85725">
-              <a:solidFill>
-                <a:schemeClr val="bg1">
-                  <a:alpha val="70914"/>
-                </a:schemeClr>
-              </a:solidFill>
-              <a:prstDash val="dash"/>
-            </a:ln>
-          </p:spPr>
-          <p:style>
-            <a:lnRef idx="1">
-              <a:schemeClr val="accent1"/>
-            </a:lnRef>
-            <a:fillRef idx="0">
-              <a:schemeClr val="accent1"/>
-            </a:fillRef>
-            <a:effectRef idx="0">
-              <a:schemeClr val="accent1"/>
-            </a:effectRef>
-            <a:fontRef idx="minor">
-              <a:schemeClr val="tx1"/>
-            </a:fontRef>
-          </p:style>
-        </p:cxnSp>
-      </p:grpSp>
+          <a:prstGeom prst="rect">
+            <a:avLst/>
+          </a:prstGeom>
+        </p:spPr>
+      </p:pic>
     </p:spTree>
     <p:extLst>
       <p:ext uri="{BB962C8B-B14F-4D97-AF65-F5344CB8AC3E}">
-        <p14:creationId xmlns:p14="http://schemas.microsoft.com/office/powerpoint/2010/main" val="670777789"/>
+        <p14:creationId xmlns:p14="http://schemas.microsoft.com/office/powerpoint/2010/main" val="2776525879"/>
       </p:ext>
     </p:extLst>
   </p:cSld>
@@ -3835,39 +3396,39 @@
         <a:sysClr val="window" lastClr="FFFFFF"/>
       </a:lt1>
       <a:dk2>
-        <a:srgbClr val="44546A"/>
+        <a:srgbClr val="0E2841"/>
       </a:dk2>
       <a:lt2>
-        <a:srgbClr val="E7E6E6"/>
+        <a:srgbClr val="E8E8E8"/>
       </a:lt2>
       <a:accent1>
-        <a:srgbClr val="4472C4"/>
+        <a:srgbClr val="156082"/>
       </a:accent1>
       <a:accent2>
-        <a:srgbClr val="ED7D31"/>
+        <a:srgbClr val="E97132"/>
       </a:accent2>
       <a:accent3>
-        <a:srgbClr val="A5A5A5"/>
+        <a:srgbClr val="196B24"/>
       </a:accent3>
       <a:accent4>
-        <a:srgbClr val="FFC000"/>
+        <a:srgbClr val="0F9ED5"/>
       </a:accent4>
       <a:accent5>
-        <a:srgbClr val="5B9BD5"/>
+        <a:srgbClr val="A02B93"/>
       </a:accent5>
       <a:accent6>
-        <a:srgbClr val="70AD47"/>
+        <a:srgbClr val="4EA72E"/>
       </a:accent6>
       <a:hlink>
-        <a:srgbClr val="0563C1"/>
+        <a:srgbClr val="467886"/>
       </a:hlink>
       <a:folHlink>
-        <a:srgbClr val="954F72"/>
+        <a:srgbClr val="96607D"/>
       </a:folHlink>
     </a:clrScheme>
     <a:fontScheme name="Office">
       <a:majorFont>
-        <a:latin typeface="Calibri Light" panose="020F0302020204030204"/>
+        <a:latin typeface="Aptos Display" panose="02110004020202020204"/>
         <a:ea typeface=""/>
         <a:cs typeface=""/>
         <a:font script="Jpan" typeface="游ゴシック Light"/>
@@ -3919,7 +3480,7 @@
         <a:font script="Tfng" typeface="Ebrima"/>
       </a:majorFont>
       <a:minorFont>
-        <a:latin typeface="Calibri" panose="020F0502020204030204"/>
+        <a:latin typeface="Aptos" panose="02110004020202020204"/>
         <a:ea typeface=""/>
         <a:cs typeface=""/>
         <a:font script="Jpan" typeface="游ゴシック"/>
@@ -4030,13 +3591,6 @@
         </a:gradFill>
       </a:fillStyleLst>
       <a:lnStyleLst>
-        <a:ln w="6350" cap="flat" cmpd="sng" algn="ctr">
-          <a:solidFill>
-            <a:schemeClr val="phClr"/>
-          </a:solidFill>
-          <a:prstDash val="solid"/>
-          <a:miter lim="800000"/>
-        </a:ln>
         <a:ln w="12700" cap="flat" cmpd="sng" algn="ctr">
           <a:solidFill>
             <a:schemeClr val="phClr"/>
@@ -4045,6 +3599,13 @@
           <a:miter lim="800000"/>
         </a:ln>
         <a:ln w="19050" cap="flat" cmpd="sng" algn="ctr">
+          <a:solidFill>
+            <a:schemeClr val="phClr"/>
+          </a:solidFill>
+          <a:prstDash val="solid"/>
+          <a:miter lim="800000"/>
+        </a:ln>
+        <a:ln w="25400" cap="flat" cmpd="sng" algn="ctr">
           <a:solidFill>
             <a:schemeClr val="phClr"/>
           </a:solidFill>
@@ -4109,11 +3670,31 @@
       </a:bgFillStyleLst>
     </a:fmtScheme>
   </a:themeElements>
-  <a:objectDefaults/>
+  <a:objectDefaults>
+    <a:lnDef>
+      <a:spPr/>
+      <a:bodyPr/>
+      <a:lstStyle/>
+      <a:style>
+        <a:lnRef idx="2">
+          <a:schemeClr val="accent1"/>
+        </a:lnRef>
+        <a:fillRef idx="0">
+          <a:schemeClr val="accent1"/>
+        </a:fillRef>
+        <a:effectRef idx="1">
+          <a:schemeClr val="accent1"/>
+        </a:effectRef>
+        <a:fontRef idx="minor">
+          <a:schemeClr val="tx1"/>
+        </a:fontRef>
+      </a:style>
+    </a:lnDef>
+  </a:objectDefaults>
   <a:extraClrSchemeLst/>
   <a:extLst>
     <a:ext uri="{05A4C25C-085E-4340-85A3-A5531E510DB2}">
-      <thm15:themeFamily xmlns:thm15="http://schemas.microsoft.com/office/thememl/2012/main" name="Office Theme" id="{62F939B6-93AF-4DB8-9C6B-D6C7DFDC589F}" vid="{4A3C46E8-61CC-4603-A589-7422A47A8E4A}"/>
+      <thm15:themeFamily xmlns:thm15="http://schemas.microsoft.com/office/thememl/2012/main" name="Office Theme" id="{2E142A2C-CD16-42D6-873A-C26D2A0506FA}" vid="{1BDDFF52-6CD6-40A5-AB3C-68EB2F1E4D0A}"/>
     </a:ext>
   </a:extLst>
 </a:theme>

</xml_diff>

<commit_message>
Elise added stats to figure 4
</commit_message>
<xml_diff>
--- a/figures/fig4.pptx
+++ b/figures/fig4.pptx
@@ -3342,36 +3342,666 @@
           <a:chExt cx="0" cy="0"/>
         </a:xfrm>
       </p:grpSpPr>
-      <p:pic>
-        <p:nvPicPr>
-          <p:cNvPr id="4" name="Picture 3">
-            <a:extLst>
-              <a:ext uri="{FF2B5EF4-FFF2-40B4-BE49-F238E27FC236}">
-                <a16:creationId xmlns:a16="http://schemas.microsoft.com/office/drawing/2014/main" id="{A778A252-9BA2-9A46-55D5-41CB21145471}"/>
-              </a:ext>
-            </a:extLst>
-          </p:cNvPr>
-          <p:cNvPicPr>
-            <a:picLocks noChangeAspect="1"/>
-          </p:cNvPicPr>
+      <p:grpSp>
+        <p:nvGrpSpPr>
+          <p:cNvPr id="20" name="Group 19">
+            <a:extLst>
+              <a:ext uri="{FF2B5EF4-FFF2-40B4-BE49-F238E27FC236}">
+                <a16:creationId xmlns:a16="http://schemas.microsoft.com/office/drawing/2014/main" id="{DA2C5E1E-1960-DAE9-6AFF-00AEB2DD8472}"/>
+              </a:ext>
+            </a:extLst>
+          </p:cNvPr>
+          <p:cNvGrpSpPr/>
           <p:nvPr/>
-        </p:nvPicPr>
-        <p:blipFill>
-          <a:blip r:embed="rId2"/>
-          <a:stretch>
-            <a:fillRect/>
-          </a:stretch>
-        </p:blipFill>
-        <p:spPr>
+        </p:nvGrpSpPr>
+        <p:grpSpPr>
           <a:xfrm>
             <a:off x="522444" y="1091046"/>
             <a:ext cx="11147111" cy="5066867"/>
+            <a:chOff x="522444" y="1091046"/>
+            <a:chExt cx="11147111" cy="5066867"/>
           </a:xfrm>
-          <a:prstGeom prst="rect">
-            <a:avLst/>
-          </a:prstGeom>
-        </p:spPr>
-      </p:pic>
+        </p:grpSpPr>
+        <p:pic>
+          <p:nvPicPr>
+            <p:cNvPr id="4" name="Picture 3">
+              <a:extLst>
+                <a:ext uri="{FF2B5EF4-FFF2-40B4-BE49-F238E27FC236}">
+                  <a16:creationId xmlns:a16="http://schemas.microsoft.com/office/drawing/2014/main" id="{A778A252-9BA2-9A46-55D5-41CB21145471}"/>
+                </a:ext>
+              </a:extLst>
+            </p:cNvPr>
+            <p:cNvPicPr>
+              <a:picLocks noChangeAspect="1"/>
+            </p:cNvPicPr>
+            <p:nvPr/>
+          </p:nvPicPr>
+          <p:blipFill>
+            <a:blip r:embed="rId2"/>
+            <a:stretch>
+              <a:fillRect/>
+            </a:stretch>
+          </p:blipFill>
+          <p:spPr>
+            <a:xfrm>
+              <a:off x="522444" y="1091046"/>
+              <a:ext cx="11147111" cy="5066867"/>
+            </a:xfrm>
+            <a:prstGeom prst="rect">
+              <a:avLst/>
+            </a:prstGeom>
+            <a:ln>
+              <a:noFill/>
+            </a:ln>
+          </p:spPr>
+        </p:pic>
+        <p:sp>
+          <p:nvSpPr>
+            <p:cNvPr id="6" name="Left Bracket 5">
+              <a:extLst>
+                <a:ext uri="{FF2B5EF4-FFF2-40B4-BE49-F238E27FC236}">
+                  <a16:creationId xmlns:a16="http://schemas.microsoft.com/office/drawing/2014/main" id="{D3456BF2-D770-BAAC-70B6-8C11E2E8A265}"/>
+                </a:ext>
+              </a:extLst>
+            </p:cNvPr>
+            <p:cNvSpPr/>
+            <p:nvPr/>
+          </p:nvSpPr>
+          <p:spPr>
+            <a:xfrm rot="5400000">
+              <a:off x="2308428" y="1979423"/>
+              <a:ext cx="321547" cy="1085222"/>
+            </a:xfrm>
+            <a:prstGeom prst="leftBracket">
+              <a:avLst/>
+            </a:prstGeom>
+            <a:ln w="9525">
+              <a:solidFill>
+                <a:schemeClr val="bg1">
+                  <a:lumMod val="50000"/>
+                </a:schemeClr>
+              </a:solidFill>
+            </a:ln>
+          </p:spPr>
+          <p:style>
+            <a:lnRef idx="2">
+              <a:schemeClr val="accent1"/>
+            </a:lnRef>
+            <a:fillRef idx="0">
+              <a:schemeClr val="accent1"/>
+            </a:fillRef>
+            <a:effectRef idx="1">
+              <a:schemeClr val="accent1"/>
+            </a:effectRef>
+            <a:fontRef idx="minor">
+              <a:schemeClr val="tx1"/>
+            </a:fontRef>
+          </p:style>
+          <p:txBody>
+            <a:bodyPr rtlCol="0" anchor="ctr"/>
+            <a:lstStyle/>
+            <a:p>
+              <a:pPr algn="ctr"/>
+              <a:endParaRPr lang="en-US"/>
+            </a:p>
+          </p:txBody>
+        </p:sp>
+        <p:sp>
+          <p:nvSpPr>
+            <p:cNvPr id="7" name="Left Bracket 6">
+              <a:extLst>
+                <a:ext uri="{FF2B5EF4-FFF2-40B4-BE49-F238E27FC236}">
+                  <a16:creationId xmlns:a16="http://schemas.microsoft.com/office/drawing/2014/main" id="{E54BDEBB-76B8-BBCD-0FA1-CDC8278B38A2}"/>
+                </a:ext>
+              </a:extLst>
+            </p:cNvPr>
+            <p:cNvSpPr/>
+            <p:nvPr/>
+          </p:nvSpPr>
+          <p:spPr>
+            <a:xfrm rot="5400000">
+              <a:off x="2899985" y="993513"/>
+              <a:ext cx="321547" cy="2268337"/>
+            </a:xfrm>
+            <a:prstGeom prst="leftBracket">
+              <a:avLst/>
+            </a:prstGeom>
+            <a:ln w="9525">
+              <a:solidFill>
+                <a:schemeClr val="bg1">
+                  <a:lumMod val="50000"/>
+                </a:schemeClr>
+              </a:solidFill>
+            </a:ln>
+          </p:spPr>
+          <p:style>
+            <a:lnRef idx="2">
+              <a:schemeClr val="accent1"/>
+            </a:lnRef>
+            <a:fillRef idx="0">
+              <a:schemeClr val="accent1"/>
+            </a:fillRef>
+            <a:effectRef idx="1">
+              <a:schemeClr val="accent1"/>
+            </a:effectRef>
+            <a:fontRef idx="minor">
+              <a:schemeClr val="tx1"/>
+            </a:fontRef>
+          </p:style>
+          <p:txBody>
+            <a:bodyPr rtlCol="0" anchor="ctr"/>
+            <a:lstStyle/>
+            <a:p>
+              <a:pPr algn="ctr"/>
+              <a:endParaRPr lang="en-US"/>
+            </a:p>
+          </p:txBody>
+        </p:sp>
+        <p:sp>
+          <p:nvSpPr>
+            <p:cNvPr id="8" name="Left Bracket 7">
+              <a:extLst>
+                <a:ext uri="{FF2B5EF4-FFF2-40B4-BE49-F238E27FC236}">
+                  <a16:creationId xmlns:a16="http://schemas.microsoft.com/office/drawing/2014/main" id="{DD48D661-50F8-A04C-E1E0-A1E4DCC6A7DD}"/>
+                </a:ext>
+              </a:extLst>
+            </p:cNvPr>
+            <p:cNvSpPr/>
+            <p:nvPr/>
+          </p:nvSpPr>
+          <p:spPr>
+            <a:xfrm rot="5400000">
+              <a:off x="3465595" y="33553"/>
+              <a:ext cx="321547" cy="3399556"/>
+            </a:xfrm>
+            <a:prstGeom prst="leftBracket">
+              <a:avLst/>
+            </a:prstGeom>
+            <a:ln w="9525">
+              <a:solidFill>
+                <a:schemeClr val="bg1">
+                  <a:lumMod val="50000"/>
+                </a:schemeClr>
+              </a:solidFill>
+            </a:ln>
+          </p:spPr>
+          <p:style>
+            <a:lnRef idx="2">
+              <a:schemeClr val="accent1"/>
+            </a:lnRef>
+            <a:fillRef idx="0">
+              <a:schemeClr val="accent1"/>
+            </a:fillRef>
+            <a:effectRef idx="1">
+              <a:schemeClr val="accent1"/>
+            </a:effectRef>
+            <a:fontRef idx="minor">
+              <a:schemeClr val="tx1"/>
+            </a:fontRef>
+          </p:style>
+          <p:txBody>
+            <a:bodyPr rtlCol="0" anchor="ctr"/>
+            <a:lstStyle/>
+            <a:p>
+              <a:pPr algn="ctr"/>
+              <a:endParaRPr lang="en-US"/>
+            </a:p>
+          </p:txBody>
+        </p:sp>
+        <p:sp>
+          <p:nvSpPr>
+            <p:cNvPr id="11" name="TextBox 10">
+              <a:extLst>
+                <a:ext uri="{FF2B5EF4-FFF2-40B4-BE49-F238E27FC236}">
+                  <a16:creationId xmlns:a16="http://schemas.microsoft.com/office/drawing/2014/main" id="{12B090D9-AAA7-2A7C-353D-2E0CFFA69075}"/>
+                </a:ext>
+              </a:extLst>
+            </p:cNvPr>
+            <p:cNvSpPr txBox="1"/>
+            <p:nvPr/>
+          </p:nvSpPr>
+          <p:spPr>
+            <a:xfrm>
+              <a:off x="1916004" y="2341412"/>
+              <a:ext cx="1106393" cy="461665"/>
+            </a:xfrm>
+            <a:prstGeom prst="rect">
+              <a:avLst/>
+            </a:prstGeom>
+            <a:noFill/>
+            <a:ln w="9525">
+              <a:noFill/>
+            </a:ln>
+          </p:spPr>
+          <p:txBody>
+            <a:bodyPr wrap="none" rtlCol="0">
+              <a:spAutoFit/>
+            </a:bodyPr>
+            <a:lstStyle/>
+            <a:p>
+              <a:pPr algn="ctr"/>
+              <a:r>
+                <a:rPr lang="en-US" sz="1200" dirty="0">
+                  <a:latin typeface="Arial" panose="020B0604020202020204" pitchFamily="34" charset="0"/>
+                  <a:cs typeface="Arial" panose="020B0604020202020204" pitchFamily="34" charset="0"/>
+                </a:rPr>
+                <a:t>Diff: 0.11 </a:t>
+              </a:r>
+            </a:p>
+            <a:p>
+              <a:pPr algn="ctr"/>
+              <a:r>
+                <a:rPr lang="en-US" sz="1200" dirty="0">
+                  <a:latin typeface="Arial" panose="020B0604020202020204" pitchFamily="34" charset="0"/>
+                  <a:cs typeface="Arial" panose="020B0604020202020204" pitchFamily="34" charset="0"/>
+                </a:rPr>
+                <a:t>(-0.01 – 0.22)</a:t>
+              </a:r>
+            </a:p>
+          </p:txBody>
+        </p:sp>
+        <p:sp>
+          <p:nvSpPr>
+            <p:cNvPr id="12" name="TextBox 11">
+              <a:extLst>
+                <a:ext uri="{FF2B5EF4-FFF2-40B4-BE49-F238E27FC236}">
+                  <a16:creationId xmlns:a16="http://schemas.microsoft.com/office/drawing/2014/main" id="{5708FF79-B0FC-C76B-78EF-4341B5DC1AD7}"/>
+                </a:ext>
+              </a:extLst>
+            </p:cNvPr>
+            <p:cNvSpPr txBox="1"/>
+            <p:nvPr/>
+          </p:nvSpPr>
+          <p:spPr>
+            <a:xfrm>
+              <a:off x="2519975" y="1913951"/>
+              <a:ext cx="1106393" cy="461665"/>
+            </a:xfrm>
+            <a:prstGeom prst="rect">
+              <a:avLst/>
+            </a:prstGeom>
+            <a:noFill/>
+          </p:spPr>
+          <p:txBody>
+            <a:bodyPr wrap="none" rtlCol="0">
+              <a:spAutoFit/>
+            </a:bodyPr>
+            <a:lstStyle/>
+            <a:p>
+              <a:pPr algn="ctr"/>
+              <a:r>
+                <a:rPr lang="en-US" sz="1200" dirty="0">
+                  <a:latin typeface="Arial" panose="020B0604020202020204" pitchFamily="34" charset="0"/>
+                  <a:cs typeface="Arial" panose="020B0604020202020204" pitchFamily="34" charset="0"/>
+                </a:rPr>
+                <a:t>Diff: 0.09 </a:t>
+              </a:r>
+            </a:p>
+            <a:p>
+              <a:pPr algn="ctr"/>
+              <a:r>
+                <a:rPr lang="en-US" sz="1200" dirty="0">
+                  <a:latin typeface="Arial" panose="020B0604020202020204" pitchFamily="34" charset="0"/>
+                  <a:cs typeface="Arial" panose="020B0604020202020204" pitchFamily="34" charset="0"/>
+                </a:rPr>
+                <a:t>(-0.04 – 0.21)</a:t>
+              </a:r>
+            </a:p>
+          </p:txBody>
+        </p:sp>
+        <p:sp>
+          <p:nvSpPr>
+            <p:cNvPr id="13" name="TextBox 12">
+              <a:extLst>
+                <a:ext uri="{FF2B5EF4-FFF2-40B4-BE49-F238E27FC236}">
+                  <a16:creationId xmlns:a16="http://schemas.microsoft.com/office/drawing/2014/main" id="{31BB64CF-7DE7-3FEE-2411-21B4CE963D8B}"/>
+                </a:ext>
+              </a:extLst>
+            </p:cNvPr>
+            <p:cNvSpPr txBox="1"/>
+            <p:nvPr/>
+          </p:nvSpPr>
+          <p:spPr>
+            <a:xfrm>
+              <a:off x="3060758" y="1546459"/>
+              <a:ext cx="1106393" cy="461665"/>
+            </a:xfrm>
+            <a:prstGeom prst="rect">
+              <a:avLst/>
+            </a:prstGeom>
+            <a:noFill/>
+          </p:spPr>
+          <p:txBody>
+            <a:bodyPr wrap="none" rtlCol="0">
+              <a:spAutoFit/>
+            </a:bodyPr>
+            <a:lstStyle/>
+            <a:p>
+              <a:pPr algn="ctr"/>
+              <a:r>
+                <a:rPr lang="en-US" sz="1200" dirty="0">
+                  <a:latin typeface="Arial" panose="020B0604020202020204" pitchFamily="34" charset="0"/>
+                  <a:cs typeface="Arial" panose="020B0604020202020204" pitchFamily="34" charset="0"/>
+                </a:rPr>
+                <a:t>Diff: -0.00 </a:t>
+              </a:r>
+            </a:p>
+            <a:p>
+              <a:pPr algn="ctr"/>
+              <a:r>
+                <a:rPr lang="en-US" sz="1200" dirty="0">
+                  <a:latin typeface="Arial" panose="020B0604020202020204" pitchFamily="34" charset="0"/>
+                  <a:cs typeface="Arial" panose="020B0604020202020204" pitchFamily="34" charset="0"/>
+                </a:rPr>
+                <a:t>(-0.12 – 0.12)</a:t>
+              </a:r>
+            </a:p>
+          </p:txBody>
+        </p:sp>
+        <p:sp>
+          <p:nvSpPr>
+            <p:cNvPr id="14" name="TextBox 13">
+              <a:extLst>
+                <a:ext uri="{FF2B5EF4-FFF2-40B4-BE49-F238E27FC236}">
+                  <a16:creationId xmlns:a16="http://schemas.microsoft.com/office/drawing/2014/main" id="{B1787548-F66C-3507-04C3-6FE999463918}"/>
+                </a:ext>
+              </a:extLst>
+            </p:cNvPr>
+            <p:cNvSpPr txBox="1"/>
+            <p:nvPr/>
+          </p:nvSpPr>
+          <p:spPr>
+            <a:xfrm>
+              <a:off x="7569794" y="2329603"/>
+              <a:ext cx="1106393" cy="461665"/>
+            </a:xfrm>
+            <a:prstGeom prst="rect">
+              <a:avLst/>
+            </a:prstGeom>
+            <a:noFill/>
+            <a:ln w="9525">
+              <a:noFill/>
+            </a:ln>
+          </p:spPr>
+          <p:txBody>
+            <a:bodyPr wrap="none" rtlCol="0">
+              <a:spAutoFit/>
+            </a:bodyPr>
+            <a:lstStyle/>
+            <a:p>
+              <a:pPr algn="ctr"/>
+              <a:r>
+                <a:rPr lang="en-US" sz="1200" dirty="0">
+                  <a:latin typeface="Arial" panose="020B0604020202020204" pitchFamily="34" charset="0"/>
+                  <a:cs typeface="Arial" panose="020B0604020202020204" pitchFamily="34" charset="0"/>
+                </a:rPr>
+                <a:t>Diff: -0.00 </a:t>
+              </a:r>
+            </a:p>
+            <a:p>
+              <a:pPr algn="ctr"/>
+              <a:r>
+                <a:rPr lang="en-US" sz="1200" dirty="0">
+                  <a:latin typeface="Arial" panose="020B0604020202020204" pitchFamily="34" charset="0"/>
+                  <a:cs typeface="Arial" panose="020B0604020202020204" pitchFamily="34" charset="0"/>
+                </a:rPr>
+                <a:t>(-0.01 – 0.00)</a:t>
+              </a:r>
+            </a:p>
+          </p:txBody>
+        </p:sp>
+        <p:sp>
+          <p:nvSpPr>
+            <p:cNvPr id="15" name="TextBox 14">
+              <a:extLst>
+                <a:ext uri="{FF2B5EF4-FFF2-40B4-BE49-F238E27FC236}">
+                  <a16:creationId xmlns:a16="http://schemas.microsoft.com/office/drawing/2014/main" id="{E51E5245-2F4E-B16C-5A91-70FC339AA8BB}"/>
+                </a:ext>
+              </a:extLst>
+            </p:cNvPr>
+            <p:cNvSpPr txBox="1"/>
+            <p:nvPr/>
+          </p:nvSpPr>
+          <p:spPr>
+            <a:xfrm>
+              <a:off x="8173764" y="1921527"/>
+              <a:ext cx="1106393" cy="461665"/>
+            </a:xfrm>
+            <a:prstGeom prst="rect">
+              <a:avLst/>
+            </a:prstGeom>
+            <a:noFill/>
+          </p:spPr>
+          <p:txBody>
+            <a:bodyPr wrap="none" rtlCol="0">
+              <a:spAutoFit/>
+            </a:bodyPr>
+            <a:lstStyle/>
+            <a:p>
+              <a:pPr algn="ctr"/>
+              <a:r>
+                <a:rPr lang="en-US" sz="1200" dirty="0">
+                  <a:latin typeface="Arial" panose="020B0604020202020204" pitchFamily="34" charset="0"/>
+                  <a:cs typeface="Arial" panose="020B0604020202020204" pitchFamily="34" charset="0"/>
+                </a:rPr>
+                <a:t>Diff: 0.00</a:t>
+              </a:r>
+            </a:p>
+            <a:p>
+              <a:pPr algn="ctr"/>
+              <a:r>
+                <a:rPr lang="en-US" sz="1200" dirty="0">
+                  <a:latin typeface="Arial" panose="020B0604020202020204" pitchFamily="34" charset="0"/>
+                  <a:cs typeface="Arial" panose="020B0604020202020204" pitchFamily="34" charset="0"/>
+                </a:rPr>
+                <a:t>(-0.00 – 0.01)</a:t>
+              </a:r>
+            </a:p>
+          </p:txBody>
+        </p:sp>
+        <p:sp>
+          <p:nvSpPr>
+            <p:cNvPr id="16" name="TextBox 15">
+              <a:extLst>
+                <a:ext uri="{FF2B5EF4-FFF2-40B4-BE49-F238E27FC236}">
+                  <a16:creationId xmlns:a16="http://schemas.microsoft.com/office/drawing/2014/main" id="{D3D65FB4-E88F-620E-0759-BCCE9F184D67}"/>
+                </a:ext>
+              </a:extLst>
+            </p:cNvPr>
+            <p:cNvSpPr txBox="1"/>
+            <p:nvPr/>
+          </p:nvSpPr>
+          <p:spPr>
+            <a:xfrm>
+              <a:off x="8699186" y="1546459"/>
+              <a:ext cx="1106393" cy="461665"/>
+            </a:xfrm>
+            <a:prstGeom prst="rect">
+              <a:avLst/>
+            </a:prstGeom>
+            <a:noFill/>
+          </p:spPr>
+          <p:txBody>
+            <a:bodyPr wrap="none" rtlCol="0">
+              <a:spAutoFit/>
+            </a:bodyPr>
+            <a:lstStyle/>
+            <a:p>
+              <a:pPr algn="ctr"/>
+              <a:r>
+                <a:rPr lang="en-US" sz="1200" dirty="0">
+                  <a:latin typeface="Arial" panose="020B0604020202020204" pitchFamily="34" charset="0"/>
+                  <a:cs typeface="Arial" panose="020B0604020202020204" pitchFamily="34" charset="0"/>
+                </a:rPr>
+                <a:t>Diff: -0.00 </a:t>
+              </a:r>
+            </a:p>
+            <a:p>
+              <a:pPr algn="ctr"/>
+              <a:r>
+                <a:rPr lang="en-US" sz="1200" dirty="0">
+                  <a:latin typeface="Arial" panose="020B0604020202020204" pitchFamily="34" charset="0"/>
+                  <a:cs typeface="Arial" panose="020B0604020202020204" pitchFamily="34" charset="0"/>
+                </a:rPr>
+                <a:t>(-0.01 – 0.00)</a:t>
+              </a:r>
+            </a:p>
+          </p:txBody>
+        </p:sp>
+        <p:sp>
+          <p:nvSpPr>
+            <p:cNvPr id="17" name="Left Bracket 16">
+              <a:extLst>
+                <a:ext uri="{FF2B5EF4-FFF2-40B4-BE49-F238E27FC236}">
+                  <a16:creationId xmlns:a16="http://schemas.microsoft.com/office/drawing/2014/main" id="{53F46566-208B-6D15-5AB0-C192C1661FD7}"/>
+                </a:ext>
+              </a:extLst>
+            </p:cNvPr>
+            <p:cNvSpPr/>
+            <p:nvPr/>
+          </p:nvSpPr>
+          <p:spPr>
+            <a:xfrm rot="5400000">
+              <a:off x="9106971" y="60975"/>
+              <a:ext cx="321547" cy="3399556"/>
+            </a:xfrm>
+            <a:prstGeom prst="leftBracket">
+              <a:avLst/>
+            </a:prstGeom>
+            <a:ln w="9525">
+              <a:solidFill>
+                <a:schemeClr val="bg1">
+                  <a:lumMod val="50000"/>
+                </a:schemeClr>
+              </a:solidFill>
+            </a:ln>
+          </p:spPr>
+          <p:style>
+            <a:lnRef idx="2">
+              <a:schemeClr val="accent1"/>
+            </a:lnRef>
+            <a:fillRef idx="0">
+              <a:schemeClr val="accent1"/>
+            </a:fillRef>
+            <a:effectRef idx="1">
+              <a:schemeClr val="accent1"/>
+            </a:effectRef>
+            <a:fontRef idx="minor">
+              <a:schemeClr val="tx1"/>
+            </a:fontRef>
+          </p:style>
+          <p:txBody>
+            <a:bodyPr rtlCol="0" anchor="ctr"/>
+            <a:lstStyle/>
+            <a:p>
+              <a:pPr algn="ctr"/>
+              <a:endParaRPr lang="en-US"/>
+            </a:p>
+          </p:txBody>
+        </p:sp>
+        <p:sp>
+          <p:nvSpPr>
+            <p:cNvPr id="18" name="Left Bracket 17">
+              <a:extLst>
+                <a:ext uri="{FF2B5EF4-FFF2-40B4-BE49-F238E27FC236}">
+                  <a16:creationId xmlns:a16="http://schemas.microsoft.com/office/drawing/2014/main" id="{B554F48D-8CEF-D2DA-543C-A132DB239170}"/>
+                </a:ext>
+              </a:extLst>
+            </p:cNvPr>
+            <p:cNvSpPr/>
+            <p:nvPr/>
+          </p:nvSpPr>
+          <p:spPr>
+            <a:xfrm rot="5400000">
+              <a:off x="8541361" y="991389"/>
+              <a:ext cx="321547" cy="2268337"/>
+            </a:xfrm>
+            <a:prstGeom prst="leftBracket">
+              <a:avLst/>
+            </a:prstGeom>
+            <a:ln w="9525">
+              <a:solidFill>
+                <a:schemeClr val="bg1">
+                  <a:lumMod val="50000"/>
+                </a:schemeClr>
+              </a:solidFill>
+            </a:ln>
+          </p:spPr>
+          <p:style>
+            <a:lnRef idx="2">
+              <a:schemeClr val="accent1"/>
+            </a:lnRef>
+            <a:fillRef idx="0">
+              <a:schemeClr val="accent1"/>
+            </a:fillRef>
+            <a:effectRef idx="1">
+              <a:schemeClr val="accent1"/>
+            </a:effectRef>
+            <a:fontRef idx="minor">
+              <a:schemeClr val="tx1"/>
+            </a:fontRef>
+          </p:style>
+          <p:txBody>
+            <a:bodyPr rtlCol="0" anchor="ctr"/>
+            <a:lstStyle/>
+            <a:p>
+              <a:pPr algn="ctr"/>
+              <a:endParaRPr lang="en-US"/>
+            </a:p>
+          </p:txBody>
+        </p:sp>
+        <p:sp>
+          <p:nvSpPr>
+            <p:cNvPr id="19" name="Left Bracket 18">
+              <a:extLst>
+                <a:ext uri="{FF2B5EF4-FFF2-40B4-BE49-F238E27FC236}">
+                  <a16:creationId xmlns:a16="http://schemas.microsoft.com/office/drawing/2014/main" id="{740AA5C5-89BB-6254-BC93-F1051863E7E4}"/>
+                </a:ext>
+              </a:extLst>
+            </p:cNvPr>
+            <p:cNvSpPr/>
+            <p:nvPr/>
+          </p:nvSpPr>
+          <p:spPr>
+            <a:xfrm rot="5400000">
+              <a:off x="7945026" y="1968839"/>
+              <a:ext cx="321547" cy="1106392"/>
+            </a:xfrm>
+            <a:prstGeom prst="leftBracket">
+              <a:avLst/>
+            </a:prstGeom>
+            <a:ln w="9525">
+              <a:solidFill>
+                <a:schemeClr val="bg1">
+                  <a:lumMod val="50000"/>
+                </a:schemeClr>
+              </a:solidFill>
+            </a:ln>
+          </p:spPr>
+          <p:style>
+            <a:lnRef idx="2">
+              <a:schemeClr val="accent1"/>
+            </a:lnRef>
+            <a:fillRef idx="0">
+              <a:schemeClr val="accent1"/>
+            </a:fillRef>
+            <a:effectRef idx="1">
+              <a:schemeClr val="accent1"/>
+            </a:effectRef>
+            <a:fontRef idx="minor">
+              <a:schemeClr val="tx1"/>
+            </a:fontRef>
+          </p:style>
+          <p:txBody>
+            <a:bodyPr rtlCol="0" anchor="ctr"/>
+            <a:lstStyle/>
+            <a:p>
+              <a:pPr algn="ctr"/>
+              <a:endParaRPr lang="en-US"/>
+            </a:p>
+          </p:txBody>
+        </p:sp>
+      </p:grpSp>
     </p:spTree>
     <p:extLst>
       <p:ext uri="{BB962C8B-B14F-4D97-AF65-F5344CB8AC3E}">

</xml_diff>